<commit_message>
Ajuste mapas temas 1 de math 7 y math8
</commit_message>
<xml_diff>
--- a/fuentes/contenidos/grado07/guion01/MapaConceptual_MA_07_01_CO.pptx
+++ b/fuentes/contenidos/grado07/guion01/MapaConceptual_MA_07_01_CO.pptx
@@ -450,7 +450,7 @@
           <a:p>
             <a:fld id="{5001C876-01F7-4317-94B9-1AE222133113}" type="datetimeFigureOut">
               <a:rPr lang="es-ES" smtClean="0"/>
-              <a:t>10/08/2015</a:t>
+              <a:t>12/08/2015</a:t>
             </a:fld>
             <a:endParaRPr lang="es-ES"/>
           </a:p>
@@ -1076,7 +1076,7 @@
         </p:nvSpPr>
         <p:spPr>
           <a:xfrm>
-            <a:off x="550479" y="967498"/>
+            <a:off x="669766" y="572291"/>
             <a:ext cx="1124746" cy="439782"/>
           </a:xfrm>
           <a:prstGeom prst="rect">
@@ -1119,11 +1119,7 @@
             <a:pPr algn="ctr"/>
             <a:r>
               <a:rPr lang="es-ES" sz="1200" b="1" dirty="0" smtClean="0"/>
-              <a:t>números </a:t>
-            </a:r>
-            <a:r>
-              <a:rPr lang="es-ES" sz="1200" b="1" dirty="0" smtClean="0"/>
-              <a:t>relativos</a:t>
+              <a:t>Números relativos</a:t>
             </a:r>
             <a:endParaRPr lang="es-ES" sz="1200" b="1" dirty="0"/>
           </a:p>
@@ -1132,35 +1128,28 @@
       <p:cxnSp>
         <p:nvCxnSpPr>
           <p:cNvPr id="12" name="Conector angular 11"/>
-          <p:cNvCxnSpPr>
-            <a:stCxn id="4" idx="2"/>
-            <a:endCxn id="130" idx="0"/>
-          </p:cNvCxnSpPr>
+          <p:cNvCxnSpPr/>
           <p:nvPr/>
         </p:nvCxnSpPr>
         <p:spPr>
           <a:xfrm rot="5400000">
-            <a:off x="2905192" y="-1297735"/>
+            <a:off x="2836727" y="-1293409"/>
             <a:ext cx="117534" cy="3575277"/>
           </a:xfrm>
           <a:prstGeom prst="bentConnector3">
             <a:avLst/>
           </a:prstGeom>
-          <a:ln w="12700">
-            <a:solidFill>
-              <a:schemeClr val="tx1"/>
-            </a:solidFill>
-          </a:ln>
-        </p:spPr>
-        <p:style>
-          <a:lnRef idx="1">
-            <a:schemeClr val="accent1"/>
+          <a:ln/>
+        </p:spPr>
+        <p:style>
+          <a:lnRef idx="2">
+            <a:schemeClr val="dk1"/>
           </a:lnRef>
           <a:fillRef idx="0">
-            <a:schemeClr val="accent1"/>
-          </a:fillRef>
-          <a:effectRef idx="0">
-            <a:schemeClr val="accent1"/>
+            <a:schemeClr val="dk1"/>
+          </a:fillRef>
+          <a:effectRef idx="1">
+            <a:schemeClr val="dk1"/>
           </a:effectRef>
           <a:fontRef idx="minor">
             <a:schemeClr val="tx1"/>
@@ -1175,7 +1164,7 @@
         </p:nvSpPr>
         <p:spPr>
           <a:xfrm>
-            <a:off x="609601" y="1984472"/>
+            <a:off x="609994" y="1407459"/>
             <a:ext cx="1226010" cy="444500"/>
           </a:xfrm>
           <a:prstGeom prst="rect">
@@ -1212,33 +1201,38 @@
           <a:p>
             <a:pPr algn="ctr"/>
             <a:r>
-              <a:rPr lang="es-ES" sz="1050" dirty="0">
+              <a:rPr lang="es-ES" sz="900" dirty="0" smtClean="0">
                 <a:solidFill>
                   <a:schemeClr val="bg1"/>
                 </a:solidFill>
               </a:rPr>
-              <a:t>por tener un</a:t>
-            </a:r>
-          </a:p>
-          <a:p>
-            <a:pPr algn="ctr"/>
-            <a:r>
-              <a:rPr lang="es-ES" sz="1050" dirty="0" smtClean="0">
+              <a:t>por la ubicación de </a:t>
+            </a:r>
+            <a:r>
+              <a:rPr lang="es-ES" sz="900" dirty="0" smtClean="0">
                 <a:solidFill>
                   <a:schemeClr val="bg1"/>
                 </a:solidFill>
               </a:rPr>
-              <a:t>punto </a:t>
-            </a:r>
-            <a:r>
-              <a:rPr lang="es-ES" sz="1050" dirty="0" smtClean="0">
+              <a:t>un</a:t>
+            </a:r>
+            <a:endParaRPr lang="es-ES" sz="900" dirty="0">
+              <a:solidFill>
+                <a:schemeClr val="bg1"/>
+              </a:solidFill>
+            </a:endParaRPr>
+          </a:p>
+          <a:p>
+            <a:pPr algn="ctr"/>
+            <a:r>
+              <a:rPr lang="es-ES" sz="900" dirty="0" smtClean="0">
                 <a:solidFill>
                   <a:schemeClr val="bg1"/>
                 </a:solidFill>
               </a:rPr>
-              <a:t>de referencia</a:t>
-            </a:r>
-            <a:endParaRPr lang="es-ES" sz="1050" dirty="0">
+              <a:t>punto de referencia</a:t>
+            </a:r>
+            <a:endParaRPr lang="es-ES" sz="900" dirty="0">
               <a:solidFill>
                 <a:schemeClr val="bg1"/>
               </a:solidFill>
@@ -1248,14 +1242,139 @@
       </p:sp>
       <p:sp>
         <p:nvSpPr>
-          <p:cNvPr id="130" name="CuadroTexto 129" descr="Conector entre nodos" title="conector"/>
+          <p:cNvPr id="216" name="Rectángulo 215" descr="Nodo de primer nivel" title="Nodo01"/>
+          <p:cNvSpPr/>
+          <p:nvPr/>
+        </p:nvSpPr>
+        <p:spPr>
+          <a:xfrm>
+            <a:off x="4126735" y="594247"/>
+            <a:ext cx="1124746" cy="439782"/>
+          </a:xfrm>
+          <a:prstGeom prst="rect">
+            <a:avLst/>
+          </a:prstGeom>
+          <a:solidFill>
+            <a:schemeClr val="bg1"/>
+          </a:solidFill>
+          <a:ln>
+            <a:solidFill>
+              <a:schemeClr val="tx1"/>
+            </a:solidFill>
+          </a:ln>
+          <a:effectLst>
+            <a:outerShdw blurRad="50800" dist="38100" dir="2700000" algn="tl" rotWithShape="0">
+              <a:prstClr val="black">
+                <a:alpha val="40000"/>
+              </a:prstClr>
+            </a:outerShdw>
+          </a:effectLst>
+        </p:spPr>
+        <p:style>
+          <a:lnRef idx="2">
+            <a:schemeClr val="accent6"/>
+          </a:lnRef>
+          <a:fillRef idx="1">
+            <a:schemeClr val="lt1"/>
+          </a:fillRef>
+          <a:effectRef idx="0">
+            <a:schemeClr val="accent6"/>
+          </a:effectRef>
+          <a:fontRef idx="minor">
+            <a:schemeClr val="dk1"/>
+          </a:fontRef>
+        </p:style>
+        <p:txBody>
+          <a:bodyPr rtlCol="0" anchor="ctr"/>
+          <a:lstStyle/>
+          <a:p>
+            <a:pPr algn="ctr"/>
+            <a:r>
+              <a:rPr lang="es-ES" sz="1200" b="1" dirty="0" smtClean="0"/>
+              <a:t>Valor absoluto</a:t>
+            </a:r>
+            <a:endParaRPr lang="es-ES" sz="1200" b="1" dirty="0"/>
+          </a:p>
+        </p:txBody>
+      </p:sp>
+      <p:sp>
+        <p:nvSpPr>
+          <p:cNvPr id="220" name="Rectángulo 219" descr="Nodo de segundo nivel" title="Nodo02"/>
+          <p:cNvSpPr/>
+          <p:nvPr/>
+        </p:nvSpPr>
+        <p:spPr>
+          <a:xfrm>
+            <a:off x="6913623" y="1586073"/>
+            <a:ext cx="959380" cy="339588"/>
+          </a:xfrm>
+          <a:prstGeom prst="rect">
+            <a:avLst/>
+          </a:prstGeom>
+          <a:solidFill>
+            <a:schemeClr val="bg2">
+              <a:lumMod val="50000"/>
+            </a:schemeClr>
+          </a:solidFill>
+          <a:ln>
+            <a:solidFill>
+              <a:schemeClr val="tx1"/>
+            </a:solidFill>
+          </a:ln>
+        </p:spPr>
+        <p:style>
+          <a:lnRef idx="2">
+            <a:schemeClr val="accent6"/>
+          </a:lnRef>
+          <a:fillRef idx="1">
+            <a:schemeClr val="lt1"/>
+          </a:fillRef>
+          <a:effectRef idx="0">
+            <a:schemeClr val="accent6"/>
+          </a:effectRef>
+          <a:fontRef idx="minor">
+            <a:schemeClr val="dk1"/>
+          </a:fontRef>
+        </p:style>
+        <p:txBody>
+          <a:bodyPr rtlCol="0" anchor="ctr"/>
+          <a:lstStyle/>
+          <a:p>
+            <a:pPr algn="ctr"/>
+            <a:r>
+              <a:rPr lang="es-ES" sz="900" dirty="0">
+                <a:solidFill>
+                  <a:schemeClr val="bg1"/>
+                </a:solidFill>
+              </a:rPr>
+              <a:t>l</a:t>
+            </a:r>
+            <a:r>
+              <a:rPr lang="es-ES" sz="900" dirty="0" smtClean="0">
+                <a:solidFill>
+                  <a:schemeClr val="bg1"/>
+                </a:solidFill>
+              </a:rPr>
+              <a:t>as matemáticas</a:t>
+            </a:r>
+            <a:endParaRPr lang="es-ES" sz="900" dirty="0">
+              <a:solidFill>
+                <a:schemeClr val="bg1"/>
+              </a:solidFill>
+            </a:endParaRPr>
+          </a:p>
+        </p:txBody>
+      </p:sp>
+      <p:sp>
+        <p:nvSpPr>
+          <p:cNvPr id="274" name="CuadroTexto 273" descr="Conector entre nodos" title="conector"/>
           <p:cNvSpPr txBox="1"/>
           <p:nvPr/>
         </p:nvSpPr>
         <p:spPr>
           <a:xfrm>
-            <a:off x="217470" y="548670"/>
-            <a:ext cx="1917700" cy="369332"/>
+            <a:off x="2224475" y="1116645"/>
+            <a:ext cx="1179278" cy="230832"/>
           </a:xfrm>
           <a:prstGeom prst="rect">
             <a:avLst/>
@@ -1271,7 +1390,7 @@
             <a:pPr algn="ctr"/>
             <a:r>
               <a:rPr lang="es-ES" sz="900" dirty="0" smtClean="0"/>
-              <a:t>Se encuentra en situaciones en las que se identifican</a:t>
+              <a:t>se forma</a:t>
             </a:r>
             <a:endParaRPr lang="es-ES" sz="900" dirty="0"/>
           </a:p>
@@ -1279,14 +1398,49 @@
       </p:sp>
       <p:sp>
         <p:nvSpPr>
-          <p:cNvPr id="216" name="Rectángulo 215" descr="Nodo de primer nivel" title="Nodo01"/>
+          <p:cNvPr id="291" name="CuadroTexto 290" descr="Conector entre nodos" title="conector"/>
+          <p:cNvSpPr txBox="1"/>
+          <p:nvPr/>
+        </p:nvSpPr>
+        <p:spPr>
+          <a:xfrm>
+            <a:off x="4124546" y="1132653"/>
+            <a:ext cx="1117174" cy="230832"/>
+          </a:xfrm>
+          <a:prstGeom prst="rect">
+            <a:avLst/>
+          </a:prstGeom>
+          <a:noFill/>
+        </p:spPr>
+        <p:txBody>
+          <a:bodyPr wrap="square" rtlCol="0">
+            <a:spAutoFit/>
+          </a:bodyPr>
+          <a:lstStyle/>
+          <a:p>
+            <a:pPr algn="ctr"/>
+            <a:r>
+              <a:rPr lang="es-ES" sz="900" dirty="0" smtClean="0"/>
+              <a:t>corresponde </a:t>
+            </a:r>
+            <a:r>
+              <a:rPr lang="es-ES" sz="900" dirty="0" smtClean="0"/>
+              <a:t>a</a:t>
+            </a:r>
+            <a:endParaRPr lang="es-ES" sz="900" dirty="0"/>
+          </a:p>
+        </p:txBody>
+      </p:sp>
+      <p:sp>
+        <p:nvSpPr>
+          <p:cNvPr id="335" name="Rectángulo 334" descr="Nodo de primer nivel" title="Nodo01"/>
           <p:cNvSpPr/>
           <p:nvPr/>
         </p:nvSpPr>
         <p:spPr>
           <a:xfrm>
-            <a:off x="4683132" y="937745"/>
-            <a:ext cx="1124746" cy="439782"/>
+            <a:off x="2296701" y="637978"/>
+            <a:ext cx="1124746" cy="377218"/>
           </a:xfrm>
           <a:prstGeom prst="rect">
             <a:avLst/>
@@ -1328,11 +1482,14 @@
             <a:pPr algn="ctr"/>
             <a:r>
               <a:rPr lang="es-ES" sz="1200" b="1" dirty="0" smtClean="0"/>
-              <a:t>valor </a:t>
-            </a:r>
-            <a:r>
-              <a:rPr lang="es-ES" sz="1200" b="1" dirty="0" smtClean="0"/>
-              <a:t>absoluto</a:t>
+              <a:t>El conjunto </a:t>
+            </a:r>
+            <a:r>
+              <a:rPr lang="es-ES" sz="1200" b="1" dirty="0" smtClean="0">
+                <a:latin typeface="Cambria Math" panose="02040503050406030204" pitchFamily="18" charset="0"/>
+                <a:ea typeface="Cambria Math" panose="02040503050406030204" pitchFamily="18" charset="0"/>
+              </a:rPr>
+              <a:t>ℤ</a:t>
             </a:r>
             <a:endParaRPr lang="es-ES" sz="1200" b="1" dirty="0"/>
           </a:p>
@@ -1340,14 +1497,14 @@
       </p:sp>
       <p:sp>
         <p:nvSpPr>
-          <p:cNvPr id="218" name="CuadroTexto 217" descr="Conector entre nodos" title="conector"/>
+          <p:cNvPr id="122" name="CuadroTexto 121" descr="Conector entre nodos" title="conector"/>
           <p:cNvSpPr txBox="1"/>
           <p:nvPr/>
         </p:nvSpPr>
         <p:spPr>
           <a:xfrm>
-            <a:off x="3404875" y="2273885"/>
-            <a:ext cx="1122431" cy="230832"/>
+            <a:off x="663669" y="1132653"/>
+            <a:ext cx="1025327" cy="230832"/>
           </a:xfrm>
           <a:prstGeom prst="rect">
             <a:avLst/>
@@ -1363,863 +1520,7 @@
             <a:pPr algn="ctr"/>
             <a:r>
               <a:rPr lang="es-ES" sz="900" dirty="0" smtClean="0"/>
-              <a:t>Se representan en</a:t>
-            </a:r>
-            <a:endParaRPr lang="es-ES" sz="900" dirty="0"/>
-          </a:p>
-        </p:txBody>
-      </p:sp>
-      <p:sp>
-        <p:nvSpPr>
-          <p:cNvPr id="220" name="Rectángulo 219" descr="Nodo de segundo nivel" title="Nodo02"/>
-          <p:cNvSpPr/>
-          <p:nvPr/>
-        </p:nvSpPr>
-        <p:spPr>
-          <a:xfrm>
-            <a:off x="7813917" y="1649055"/>
-            <a:ext cx="1072293" cy="492076"/>
-          </a:xfrm>
-          <a:prstGeom prst="rect">
-            <a:avLst/>
-          </a:prstGeom>
-          <a:solidFill>
-            <a:schemeClr val="bg2">
-              <a:lumMod val="50000"/>
-            </a:schemeClr>
-          </a:solidFill>
-          <a:ln>
-            <a:solidFill>
-              <a:schemeClr val="tx1"/>
-            </a:solidFill>
-          </a:ln>
-        </p:spPr>
-        <p:style>
-          <a:lnRef idx="2">
-            <a:schemeClr val="accent6"/>
-          </a:lnRef>
-          <a:fillRef idx="1">
-            <a:schemeClr val="lt1"/>
-          </a:fillRef>
-          <a:effectRef idx="0">
-            <a:schemeClr val="accent6"/>
-          </a:effectRef>
-          <a:fontRef idx="minor">
-            <a:schemeClr val="dk1"/>
-          </a:fontRef>
-        </p:style>
-        <p:txBody>
-          <a:bodyPr rtlCol="0" anchor="ctr"/>
-          <a:lstStyle/>
-          <a:p>
-            <a:pPr algn="ctr"/>
-            <a:r>
-              <a:rPr lang="es-ES" sz="1050" dirty="0" smtClean="0">
-                <a:solidFill>
-                  <a:schemeClr val="bg1"/>
-                </a:solidFill>
-              </a:rPr>
-              <a:t>para identificar situaciones puestas</a:t>
-            </a:r>
-            <a:endParaRPr lang="es-ES" sz="1050" dirty="0">
-              <a:solidFill>
-                <a:schemeClr val="bg1"/>
-              </a:solidFill>
-            </a:endParaRPr>
-          </a:p>
-        </p:txBody>
-      </p:sp>
-      <p:cxnSp>
-        <p:nvCxnSpPr>
-          <p:cNvPr id="223" name="Conector angular 222"/>
-          <p:cNvCxnSpPr>
-            <a:stCxn id="368" idx="1"/>
-            <a:endCxn id="170" idx="1"/>
-          </p:cNvCxnSpPr>
-          <p:nvPr/>
-        </p:nvCxnSpPr>
-        <p:spPr>
-          <a:xfrm rot="10800000" flipV="1">
-            <a:off x="7736896" y="1137892"/>
-            <a:ext cx="79972" cy="2177391"/>
-          </a:xfrm>
-          <a:prstGeom prst="bentConnector3">
-            <a:avLst>
-              <a:gd name="adj1" fmla="val 385850"/>
-            </a:avLst>
-          </a:prstGeom>
-          <a:ln w="12700">
-            <a:solidFill>
-              <a:schemeClr val="tx1"/>
-            </a:solidFill>
-          </a:ln>
-        </p:spPr>
-        <p:style>
-          <a:lnRef idx="1">
-            <a:schemeClr val="accent1"/>
-          </a:lnRef>
-          <a:fillRef idx="0">
-            <a:schemeClr val="accent1"/>
-          </a:fillRef>
-          <a:effectRef idx="0">
-            <a:schemeClr val="accent1"/>
-          </a:effectRef>
-          <a:fontRef idx="minor">
-            <a:schemeClr val="tx1"/>
-          </a:fontRef>
-        </p:style>
-      </p:cxnSp>
-      <p:sp>
-        <p:nvSpPr>
-          <p:cNvPr id="274" name="CuadroTexto 273" descr="Conector entre nodos" title="conector"/>
-          <p:cNvSpPr txBox="1"/>
-          <p:nvPr/>
-        </p:nvSpPr>
-        <p:spPr>
-          <a:xfrm>
-            <a:off x="2715660" y="1483154"/>
-            <a:ext cx="1179278" cy="230832"/>
-          </a:xfrm>
-          <a:prstGeom prst="rect">
-            <a:avLst/>
-          </a:prstGeom>
-          <a:noFill/>
-        </p:spPr>
-        <p:txBody>
-          <a:bodyPr wrap="square" rtlCol="0">
-            <a:spAutoFit/>
-          </a:bodyPr>
-          <a:lstStyle/>
-          <a:p>
-            <a:pPr algn="ctr"/>
-            <a:r>
-              <a:rPr lang="es-ES" sz="900" dirty="0"/>
-              <a:t>S</a:t>
-            </a:r>
-            <a:r>
-              <a:rPr lang="es-ES" sz="900" dirty="0" smtClean="0"/>
-              <a:t>on el conjunto</a:t>
-            </a:r>
-            <a:endParaRPr lang="es-ES" sz="900" dirty="0"/>
-          </a:p>
-        </p:txBody>
-      </p:sp>
-      <p:sp>
-        <p:nvSpPr>
-          <p:cNvPr id="280" name="Rectángulo 279" descr="Nodo de segundo nivel" title="Nodo02"/>
-          <p:cNvSpPr/>
-          <p:nvPr/>
-        </p:nvSpPr>
-        <p:spPr>
-          <a:xfrm>
-            <a:off x="2124292" y="1751732"/>
-            <a:ext cx="2239648" cy="357473"/>
-          </a:xfrm>
-          <a:prstGeom prst="rect">
-            <a:avLst/>
-          </a:prstGeom>
-          <a:solidFill>
-            <a:schemeClr val="bg2">
-              <a:lumMod val="50000"/>
-            </a:schemeClr>
-          </a:solidFill>
-          <a:ln>
-            <a:solidFill>
-              <a:schemeClr val="tx1"/>
-            </a:solidFill>
-          </a:ln>
-        </p:spPr>
-        <p:style>
-          <a:lnRef idx="2">
-            <a:schemeClr val="accent6"/>
-          </a:lnRef>
-          <a:fillRef idx="1">
-            <a:schemeClr val="lt1"/>
-          </a:fillRef>
-          <a:effectRef idx="0">
-            <a:schemeClr val="accent6"/>
-          </a:effectRef>
-          <a:fontRef idx="minor">
-            <a:schemeClr val="dk1"/>
-          </a:fontRef>
-        </p:style>
-        <p:txBody>
-          <a:bodyPr rtlCol="0" anchor="ctr"/>
-          <a:lstStyle/>
-          <a:p>
-            <a:pPr algn="ctr"/>
-            <a:r>
-              <a:rPr lang="es-ES" sz="1050" b="1" dirty="0" smtClean="0">
-                <a:solidFill>
-                  <a:schemeClr val="bg1"/>
-                </a:solidFill>
-                <a:latin typeface="Cambria Math" panose="02040503050406030204" pitchFamily="18" charset="0"/>
-                <a:ea typeface="Cambria Math" panose="02040503050406030204" pitchFamily="18" charset="0"/>
-              </a:rPr>
-              <a:t>ℤ</a:t>
-            </a:r>
-            <a:r>
-              <a:rPr lang="es-ES" sz="1050" dirty="0">
-                <a:solidFill>
-                  <a:schemeClr val="bg1"/>
-                </a:solidFill>
-              </a:rPr>
-              <a:t> </a:t>
-            </a:r>
-            <a:r>
-              <a:rPr lang="es-ES" sz="1050" dirty="0" smtClean="0">
-                <a:solidFill>
-                  <a:schemeClr val="bg1"/>
-                </a:solidFill>
-              </a:rPr>
-              <a:t>= {… , -4, -3, -2, -1, 0, 1, 2, 3, 4,…}</a:t>
-            </a:r>
-            <a:endParaRPr lang="es-ES" sz="1050" b="1" dirty="0"/>
-          </a:p>
-        </p:txBody>
-      </p:sp>
-      <p:sp>
-        <p:nvSpPr>
-          <p:cNvPr id="282" name="CuadroTexto 281" descr="Conector entre nodos" title="conector"/>
-          <p:cNvSpPr txBox="1"/>
-          <p:nvPr/>
-        </p:nvSpPr>
-        <p:spPr>
-          <a:xfrm>
-            <a:off x="1918441" y="2274470"/>
-            <a:ext cx="1192355" cy="230832"/>
-          </a:xfrm>
-          <a:prstGeom prst="rect">
-            <a:avLst/>
-          </a:prstGeom>
-          <a:noFill/>
-        </p:spPr>
-        <p:txBody>
-          <a:bodyPr wrap="square" rtlCol="0">
-            <a:spAutoFit/>
-          </a:bodyPr>
-          <a:lstStyle/>
-          <a:p>
-            <a:pPr algn="ctr"/>
-            <a:r>
-              <a:rPr lang="es-ES" sz="900" dirty="0" smtClean="0"/>
-              <a:t>que </a:t>
-            </a:r>
-            <a:r>
-              <a:rPr lang="es-ES" sz="900" dirty="0" smtClean="0"/>
-              <a:t>corresponden a</a:t>
-            </a:r>
-            <a:endParaRPr lang="es-ES" sz="900" dirty="0"/>
-          </a:p>
-        </p:txBody>
-      </p:sp>
-      <p:sp>
-        <p:nvSpPr>
-          <p:cNvPr id="284" name="Rectángulo 283" descr="Nodo de tercer nivel" title="Nodo03"/>
-          <p:cNvSpPr/>
-          <p:nvPr/>
-        </p:nvSpPr>
-        <p:spPr>
-          <a:xfrm>
-            <a:off x="1930751" y="2545608"/>
-            <a:ext cx="1246566" cy="583042"/>
-          </a:xfrm>
-          <a:prstGeom prst="rect">
-            <a:avLst/>
-          </a:prstGeom>
-          <a:solidFill>
-            <a:schemeClr val="bg2">
-              <a:lumMod val="90000"/>
-            </a:schemeClr>
-          </a:solidFill>
-          <a:ln>
-            <a:solidFill>
-              <a:schemeClr val="tx1"/>
-            </a:solidFill>
-          </a:ln>
-        </p:spPr>
-        <p:style>
-          <a:lnRef idx="2">
-            <a:schemeClr val="accent6"/>
-          </a:lnRef>
-          <a:fillRef idx="1">
-            <a:schemeClr val="lt1"/>
-          </a:fillRef>
-          <a:effectRef idx="0">
-            <a:schemeClr val="accent6"/>
-          </a:effectRef>
-          <a:fontRef idx="minor">
-            <a:schemeClr val="dk1"/>
-          </a:fontRef>
-        </p:style>
-        <p:txBody>
-          <a:bodyPr rtlCol="0" anchor="ctr"/>
-          <a:lstStyle/>
-          <a:p>
-            <a:pPr algn="ctr"/>
-            <a:r>
-              <a:rPr lang="es-ES" sz="900" dirty="0" smtClean="0">
-                <a:solidFill>
-                  <a:schemeClr val="tx1"/>
-                </a:solidFill>
-              </a:rPr>
-              <a:t>los </a:t>
-            </a:r>
-            <a:r>
-              <a:rPr lang="es-ES" sz="900" dirty="0" smtClean="0">
-                <a:solidFill>
-                  <a:schemeClr val="tx1"/>
-                </a:solidFill>
-              </a:rPr>
-              <a:t>enteros negativos, el cero y </a:t>
-            </a:r>
-            <a:r>
-              <a:rPr lang="es-ES" sz="900" dirty="0" smtClean="0">
-                <a:solidFill>
-                  <a:schemeClr val="tx1"/>
-                </a:solidFill>
-              </a:rPr>
-              <a:t>los </a:t>
-            </a:r>
-            <a:r>
-              <a:rPr lang="es-ES" sz="900" dirty="0" smtClean="0">
-                <a:solidFill>
-                  <a:schemeClr val="tx1"/>
-                </a:solidFill>
-              </a:rPr>
-              <a:t>enteros positivos</a:t>
-            </a:r>
-            <a:endParaRPr lang="es-ES" sz="900" dirty="0">
-              <a:solidFill>
-                <a:schemeClr val="tx1"/>
-              </a:solidFill>
-            </a:endParaRPr>
-          </a:p>
-        </p:txBody>
-      </p:sp>
-      <p:sp>
-        <p:nvSpPr>
-          <p:cNvPr id="291" name="CuadroTexto 290" descr="Conector entre nodos" title="conector"/>
-          <p:cNvSpPr txBox="1"/>
-          <p:nvPr/>
-        </p:nvSpPr>
-        <p:spPr>
-          <a:xfrm>
-            <a:off x="4667387" y="1454453"/>
-            <a:ext cx="1117174" cy="230832"/>
-          </a:xfrm>
-          <a:prstGeom prst="rect">
-            <a:avLst/>
-          </a:prstGeom>
-          <a:noFill/>
-        </p:spPr>
-        <p:txBody>
-          <a:bodyPr wrap="square" rtlCol="0">
-            <a:spAutoFit/>
-          </a:bodyPr>
-          <a:lstStyle/>
-          <a:p>
-            <a:pPr algn="ctr"/>
-            <a:r>
-              <a:rPr lang="es-ES" sz="900" dirty="0" smtClean="0"/>
-              <a:t>que corresponde a</a:t>
-            </a:r>
-            <a:endParaRPr lang="es-ES" sz="900" dirty="0"/>
-          </a:p>
-        </p:txBody>
-      </p:sp>
-      <p:cxnSp>
-        <p:nvCxnSpPr>
-          <p:cNvPr id="293" name="Conector angular 292"/>
-          <p:cNvCxnSpPr/>
-          <p:nvPr/>
-        </p:nvCxnSpPr>
-        <p:spPr>
-          <a:xfrm>
-            <a:off x="3318072" y="2214007"/>
-            <a:ext cx="635319" cy="110678"/>
-          </a:xfrm>
-          <a:prstGeom prst="bentConnector2">
-            <a:avLst/>
-          </a:prstGeom>
-          <a:ln w="12700">
-            <a:solidFill>
-              <a:schemeClr val="tx1"/>
-            </a:solidFill>
-          </a:ln>
-        </p:spPr>
-        <p:style>
-          <a:lnRef idx="1">
-            <a:schemeClr val="accent1"/>
-          </a:lnRef>
-          <a:fillRef idx="0">
-            <a:schemeClr val="accent1"/>
-          </a:fillRef>
-          <a:effectRef idx="0">
-            <a:schemeClr val="accent1"/>
-          </a:effectRef>
-          <a:fontRef idx="minor">
-            <a:schemeClr val="tx1"/>
-          </a:fontRef>
-        </p:style>
-      </p:cxnSp>
-      <p:sp>
-        <p:nvSpPr>
-          <p:cNvPr id="335" name="Rectángulo 334" descr="Nodo de primer nivel" title="Nodo01"/>
-          <p:cNvSpPr/>
-          <p:nvPr/>
-        </p:nvSpPr>
-        <p:spPr>
-          <a:xfrm>
-            <a:off x="2703405" y="961689"/>
-            <a:ext cx="1124746" cy="439782"/>
-          </a:xfrm>
-          <a:prstGeom prst="rect">
-            <a:avLst/>
-          </a:prstGeom>
-          <a:solidFill>
-            <a:schemeClr val="bg1"/>
-          </a:solidFill>
-          <a:ln>
-            <a:solidFill>
-              <a:schemeClr val="tx1"/>
-            </a:solidFill>
-          </a:ln>
-          <a:effectLst>
-            <a:outerShdw blurRad="50800" dist="38100" dir="2700000" algn="tl" rotWithShape="0">
-              <a:prstClr val="black">
-                <a:alpha val="40000"/>
-              </a:prstClr>
-            </a:outerShdw>
-          </a:effectLst>
-        </p:spPr>
-        <p:style>
-          <a:lnRef idx="2">
-            <a:schemeClr val="accent6"/>
-          </a:lnRef>
-          <a:fillRef idx="1">
-            <a:schemeClr val="lt1"/>
-          </a:fillRef>
-          <a:effectRef idx="0">
-            <a:schemeClr val="accent6"/>
-          </a:effectRef>
-          <a:fontRef idx="minor">
-            <a:schemeClr val="dk1"/>
-          </a:fontRef>
-        </p:style>
-        <p:txBody>
-          <a:bodyPr rtlCol="0" anchor="ctr"/>
-          <a:lstStyle/>
-          <a:p>
-            <a:pPr algn="ctr"/>
-            <a:r>
-              <a:rPr lang="es-ES" sz="1200" dirty="0"/>
-              <a:t>con la letra </a:t>
-            </a:r>
-            <a:r>
-              <a:rPr lang="es-ES" sz="1200" b="1" dirty="0" smtClean="0">
-                <a:latin typeface="Cambria Math" panose="02040503050406030204" pitchFamily="18" charset="0"/>
-                <a:ea typeface="Cambria Math" panose="02040503050406030204" pitchFamily="18" charset="0"/>
-              </a:rPr>
-              <a:t>ℤ</a:t>
-            </a:r>
-            <a:endParaRPr lang="es-ES" sz="1200" b="1" dirty="0"/>
-          </a:p>
-        </p:txBody>
-      </p:sp>
-      <p:sp>
-        <p:nvSpPr>
-          <p:cNvPr id="337" name="CuadroTexto 336" descr="Conector entre nodos" title="conector"/>
-          <p:cNvSpPr txBox="1"/>
-          <p:nvPr/>
-        </p:nvSpPr>
-        <p:spPr>
-          <a:xfrm>
-            <a:off x="4670181" y="655373"/>
-            <a:ext cx="1122431" cy="230832"/>
-          </a:xfrm>
-          <a:prstGeom prst="rect">
-            <a:avLst/>
-          </a:prstGeom>
-          <a:noFill/>
-        </p:spPr>
-        <p:txBody>
-          <a:bodyPr wrap="square" rtlCol="0">
-            <a:spAutoFit/>
-          </a:bodyPr>
-          <a:lstStyle/>
-          <a:p>
-            <a:pPr algn="ctr"/>
-            <a:r>
-              <a:rPr lang="es-ES" sz="900" dirty="0" smtClean="0"/>
-              <a:t>poseen </a:t>
-            </a:r>
-            <a:r>
-              <a:rPr lang="es-ES" sz="900" dirty="0" smtClean="0"/>
-              <a:t>un</a:t>
-            </a:r>
-            <a:endParaRPr lang="es-ES" sz="900" dirty="0"/>
-          </a:p>
-        </p:txBody>
-      </p:sp>
-      <p:sp>
-        <p:nvSpPr>
-          <p:cNvPr id="341" name="CuadroTexto 340" descr="Conector entre nodos" title="conector"/>
-          <p:cNvSpPr txBox="1"/>
-          <p:nvPr/>
-        </p:nvSpPr>
-        <p:spPr>
-          <a:xfrm>
-            <a:off x="7769036" y="635626"/>
-            <a:ext cx="1117174" cy="230832"/>
-          </a:xfrm>
-          <a:prstGeom prst="rect">
-            <a:avLst/>
-          </a:prstGeom>
-          <a:noFill/>
-        </p:spPr>
-        <p:txBody>
-          <a:bodyPr wrap="square" rtlCol="0">
-            <a:spAutoFit/>
-          </a:bodyPr>
-          <a:lstStyle/>
-          <a:p>
-            <a:pPr algn="ctr"/>
-            <a:r>
-              <a:rPr lang="es-ES" sz="900" dirty="0" smtClean="0"/>
-              <a:t>tienen aplicación </a:t>
-            </a:r>
-            <a:r>
-              <a:rPr lang="es-ES" sz="900" dirty="0" smtClean="0"/>
-              <a:t>en</a:t>
-            </a:r>
-            <a:endParaRPr lang="es-ES" sz="900" dirty="0"/>
-          </a:p>
-        </p:txBody>
-      </p:sp>
-      <p:sp>
-        <p:nvSpPr>
-          <p:cNvPr id="354" name="Rectángulo 353" descr="Nodo de séptimo nivel" title="Nodo07"/>
-          <p:cNvSpPr/>
-          <p:nvPr/>
-        </p:nvSpPr>
-        <p:spPr>
-          <a:xfrm>
-            <a:off x="3327553" y="3657659"/>
-            <a:ext cx="1118927" cy="353519"/>
-          </a:xfrm>
-          <a:prstGeom prst="rect">
-            <a:avLst/>
-          </a:prstGeom>
-          <a:solidFill>
-            <a:schemeClr val="bg1"/>
-          </a:solidFill>
-          <a:ln>
-            <a:solidFill>
-              <a:schemeClr val="tx1"/>
-            </a:solidFill>
-          </a:ln>
-        </p:spPr>
-        <p:style>
-          <a:lnRef idx="2">
-            <a:schemeClr val="accent6"/>
-          </a:lnRef>
-          <a:fillRef idx="1">
-            <a:schemeClr val="lt1"/>
-          </a:fillRef>
-          <a:effectRef idx="0">
-            <a:schemeClr val="accent6"/>
-          </a:effectRef>
-          <a:fontRef idx="minor">
-            <a:schemeClr val="dk1"/>
-          </a:fontRef>
-        </p:style>
-        <p:txBody>
-          <a:bodyPr rtlCol="0" anchor="ctr"/>
-          <a:lstStyle/>
-          <a:p>
-            <a:pPr algn="ctr"/>
-            <a:r>
-              <a:rPr lang="es-ES" sz="900" dirty="0" smtClean="0">
-                <a:solidFill>
-                  <a:schemeClr val="tx1"/>
-                </a:solidFill>
-              </a:rPr>
-              <a:t>números </a:t>
-            </a:r>
-            <a:r>
-              <a:rPr lang="es-ES" sz="900" dirty="0" smtClean="0">
-                <a:solidFill>
-                  <a:schemeClr val="tx1"/>
-                </a:solidFill>
-              </a:rPr>
-              <a:t>opuestos</a:t>
-            </a:r>
-            <a:endParaRPr lang="es-ES" sz="900" dirty="0">
-              <a:solidFill>
-                <a:schemeClr val="tx1"/>
-              </a:solidFill>
-            </a:endParaRPr>
-          </a:p>
-        </p:txBody>
-      </p:sp>
-      <p:sp>
-        <p:nvSpPr>
-          <p:cNvPr id="356" name="CuadroTexto 355" descr="Conector entre nodos" title="conector"/>
-          <p:cNvSpPr txBox="1"/>
-          <p:nvPr/>
-        </p:nvSpPr>
-        <p:spPr>
-          <a:xfrm>
-            <a:off x="3324641" y="3061334"/>
-            <a:ext cx="1128276" cy="369332"/>
-          </a:xfrm>
-          <a:prstGeom prst="rect">
-            <a:avLst/>
-          </a:prstGeom>
-          <a:noFill/>
-        </p:spPr>
-        <p:txBody>
-          <a:bodyPr wrap="square" rtlCol="0">
-            <a:spAutoFit/>
-          </a:bodyPr>
-          <a:lstStyle/>
-          <a:p>
-            <a:pPr algn="ctr"/>
-            <a:r>
-              <a:rPr lang="es-ES" sz="900" dirty="0"/>
-              <a:t>d</a:t>
-            </a:r>
-            <a:r>
-              <a:rPr lang="es-ES" sz="900" dirty="0" smtClean="0"/>
-              <a:t>onde </a:t>
-            </a:r>
-            <a:r>
-              <a:rPr lang="es-ES" sz="900" dirty="0" smtClean="0"/>
-              <a:t>se identifican parejas de</a:t>
-            </a:r>
-            <a:endParaRPr lang="es-ES" sz="900" dirty="0"/>
-          </a:p>
-        </p:txBody>
-      </p:sp>
-      <p:cxnSp>
-        <p:nvCxnSpPr>
-          <p:cNvPr id="358" name="Conector angular 357"/>
-          <p:cNvCxnSpPr/>
-          <p:nvPr/>
-        </p:nvCxnSpPr>
-        <p:spPr>
-          <a:xfrm rot="16200000" flipV="1">
-            <a:off x="5205785" y="2568943"/>
-            <a:ext cx="126597" cy="877"/>
-          </a:xfrm>
-          <a:prstGeom prst="bentConnector3">
-            <a:avLst>
-              <a:gd name="adj1" fmla="val 50000"/>
-            </a:avLst>
-          </a:prstGeom>
-          <a:ln w="12700">
-            <a:solidFill>
-              <a:schemeClr val="tx1"/>
-            </a:solidFill>
-          </a:ln>
-        </p:spPr>
-        <p:style>
-          <a:lnRef idx="1">
-            <a:schemeClr val="accent1"/>
-          </a:lnRef>
-          <a:fillRef idx="0">
-            <a:schemeClr val="accent1"/>
-          </a:fillRef>
-          <a:effectRef idx="0">
-            <a:schemeClr val="accent1"/>
-          </a:effectRef>
-          <a:fontRef idx="minor">
-            <a:schemeClr val="tx1"/>
-          </a:fontRef>
-        </p:style>
-      </p:cxnSp>
-      <p:cxnSp>
-        <p:nvCxnSpPr>
-          <p:cNvPr id="359" name="Conector angular 358"/>
-          <p:cNvCxnSpPr>
-            <a:stCxn id="356" idx="0"/>
-          </p:cNvCxnSpPr>
-          <p:nvPr/>
-        </p:nvCxnSpPr>
-        <p:spPr>
-          <a:xfrm rot="16200000" flipV="1">
-            <a:off x="3806216" y="2978771"/>
-            <a:ext cx="163364" cy="1762"/>
-          </a:xfrm>
-          <a:prstGeom prst="bentConnector3">
-            <a:avLst>
-              <a:gd name="adj1" fmla="val 50000"/>
-            </a:avLst>
-          </a:prstGeom>
-          <a:ln w="12700">
-            <a:solidFill>
-              <a:schemeClr val="tx1"/>
-            </a:solidFill>
-          </a:ln>
-        </p:spPr>
-        <p:style>
-          <a:lnRef idx="1">
-            <a:schemeClr val="accent1"/>
-          </a:lnRef>
-          <a:fillRef idx="0">
-            <a:schemeClr val="accent1"/>
-          </a:fillRef>
-          <a:effectRef idx="0">
-            <a:schemeClr val="accent1"/>
-          </a:effectRef>
-          <a:fontRef idx="minor">
-            <a:schemeClr val="tx1"/>
-          </a:fontRef>
-        </p:style>
-      </p:cxnSp>
-      <p:cxnSp>
-        <p:nvCxnSpPr>
-          <p:cNvPr id="360" name="Conector angular 359"/>
-          <p:cNvCxnSpPr>
-            <a:stCxn id="354" idx="0"/>
-            <a:endCxn id="356" idx="2"/>
-          </p:cNvCxnSpPr>
-          <p:nvPr/>
-        </p:nvCxnSpPr>
-        <p:spPr>
-          <a:xfrm rot="5400000" flipH="1" flipV="1">
-            <a:off x="3774402" y="3543282"/>
-            <a:ext cx="226993" cy="1762"/>
-          </a:xfrm>
-          <a:prstGeom prst="bentConnector3">
-            <a:avLst>
-              <a:gd name="adj1" fmla="val 50000"/>
-            </a:avLst>
-          </a:prstGeom>
-          <a:ln w="12700">
-            <a:solidFill>
-              <a:schemeClr val="tx1"/>
-            </a:solidFill>
-          </a:ln>
-        </p:spPr>
-        <p:style>
-          <a:lnRef idx="1">
-            <a:schemeClr val="accent1"/>
-          </a:lnRef>
-          <a:fillRef idx="0">
-            <a:schemeClr val="accent1"/>
-          </a:fillRef>
-          <a:effectRef idx="0">
-            <a:schemeClr val="accent1"/>
-          </a:effectRef>
-          <a:fontRef idx="minor">
-            <a:schemeClr val="tx1"/>
-          </a:fontRef>
-        </p:style>
-      </p:cxnSp>
-      <p:sp>
-        <p:nvSpPr>
-          <p:cNvPr id="361" name="CuadroTexto 360" descr="Conector entre nodos" title="conector"/>
-          <p:cNvSpPr txBox="1"/>
-          <p:nvPr/>
-        </p:nvSpPr>
-        <p:spPr>
-          <a:xfrm>
-            <a:off x="2578537" y="644089"/>
-            <a:ext cx="1445176" cy="230832"/>
-          </a:xfrm>
-          <a:prstGeom prst="rect">
-            <a:avLst/>
-          </a:prstGeom>
-          <a:noFill/>
-        </p:spPr>
-        <p:txBody>
-          <a:bodyPr wrap="square" rtlCol="0">
-            <a:spAutoFit/>
-          </a:bodyPr>
-          <a:lstStyle/>
-          <a:p>
-            <a:pPr algn="ctr"/>
-            <a:r>
-              <a:rPr lang="es-ES" sz="900" dirty="0"/>
-              <a:t>s</a:t>
-            </a:r>
-            <a:r>
-              <a:rPr lang="es-ES" sz="900" dirty="0" smtClean="0"/>
-              <a:t>e identifican</a:t>
-            </a:r>
-            <a:endParaRPr lang="es-ES" sz="900" dirty="0"/>
-          </a:p>
-        </p:txBody>
-      </p:sp>
-      <p:cxnSp>
-        <p:nvCxnSpPr>
-          <p:cNvPr id="117" name="Conector angular 116"/>
-          <p:cNvCxnSpPr/>
-          <p:nvPr/>
-        </p:nvCxnSpPr>
-        <p:spPr>
-          <a:xfrm rot="16200000" flipH="1">
-            <a:off x="1080563" y="935640"/>
-            <a:ext cx="65734" cy="1157"/>
-          </a:xfrm>
-          <a:prstGeom prst="bentConnector3">
-            <a:avLst>
-              <a:gd name="adj1" fmla="val 5480"/>
-            </a:avLst>
-          </a:prstGeom>
-          <a:ln w="12700">
-            <a:solidFill>
-              <a:schemeClr val="tx1"/>
-            </a:solidFill>
-          </a:ln>
-        </p:spPr>
-        <p:style>
-          <a:lnRef idx="1">
-            <a:schemeClr val="accent1"/>
-          </a:lnRef>
-          <a:fillRef idx="0">
-            <a:schemeClr val="accent1"/>
-          </a:fillRef>
-          <a:effectRef idx="0">
-            <a:schemeClr val="accent1"/>
-          </a:effectRef>
-          <a:fontRef idx="minor">
-            <a:schemeClr val="tx1"/>
-          </a:fontRef>
-        </p:style>
-      </p:cxnSp>
-      <p:sp>
-        <p:nvSpPr>
-          <p:cNvPr id="122" name="CuadroTexto 121" descr="Conector entre nodos" title="conector"/>
-          <p:cNvSpPr txBox="1"/>
-          <p:nvPr/>
-        </p:nvSpPr>
-        <p:spPr>
-          <a:xfrm>
-            <a:off x="614607" y="1685285"/>
-            <a:ext cx="1025327" cy="230832"/>
-          </a:xfrm>
-          <a:prstGeom prst="rect">
-            <a:avLst/>
-          </a:prstGeom>
-          <a:noFill/>
-        </p:spPr>
-        <p:txBody>
-          <a:bodyPr wrap="square" rtlCol="0">
-            <a:spAutoFit/>
-          </a:bodyPr>
-          <a:lstStyle/>
-          <a:p>
-            <a:pPr algn="ctr"/>
-            <a:r>
-              <a:rPr lang="es-ES" sz="900" dirty="0"/>
-              <a:t>s</a:t>
-            </a:r>
-            <a:r>
-              <a:rPr lang="es-ES" sz="900" dirty="0" smtClean="0"/>
-              <a:t>e caracterizan</a:t>
+              <a:t>se determinan</a:t>
             </a:r>
             <a:endParaRPr lang="es-ES" sz="900" dirty="0"/>
           </a:p>
@@ -2233,8 +1534,8 @@
         </p:nvSpPr>
         <p:spPr>
           <a:xfrm>
-            <a:off x="609114" y="2430125"/>
-            <a:ext cx="1327666" cy="230832"/>
+            <a:off x="592864" y="1981781"/>
+            <a:ext cx="1096119" cy="230832"/>
           </a:xfrm>
           <a:prstGeom prst="rect">
             <a:avLst/>
@@ -2249,100 +1550,22 @@
           <a:p>
             <a:pPr algn="ctr"/>
             <a:r>
-              <a:rPr lang="es-ES" sz="900" dirty="0"/>
-              <a:t>s</a:t>
-            </a:r>
-            <a:r>
               <a:rPr lang="es-ES" sz="900" dirty="0" smtClean="0"/>
-              <a:t>e </a:t>
-            </a:r>
-            <a:r>
-              <a:rPr lang="es-ES" sz="900" dirty="0" smtClean="0"/>
-              <a:t>representan con</a:t>
+              <a:t>sintetizan el uso de </a:t>
             </a:r>
             <a:endParaRPr lang="es-ES" sz="900" dirty="0"/>
-          </a:p>
-        </p:txBody>
-      </p:sp>
-      <p:sp>
-        <p:nvSpPr>
-          <p:cNvPr id="165" name="Rectángulo 164" descr="Nodo de segundo nivel" title="Nodo02"/>
-          <p:cNvSpPr/>
-          <p:nvPr/>
-        </p:nvSpPr>
-        <p:spPr>
-          <a:xfrm>
-            <a:off x="599204" y="2806577"/>
-            <a:ext cx="1124746" cy="357473"/>
-          </a:xfrm>
-          <a:prstGeom prst="rect">
-            <a:avLst/>
-          </a:prstGeom>
-          <a:solidFill>
-            <a:schemeClr val="bg2">
-              <a:lumMod val="50000"/>
-            </a:schemeClr>
-          </a:solidFill>
-          <a:ln>
-            <a:solidFill>
-              <a:schemeClr val="tx1"/>
-            </a:solidFill>
-          </a:ln>
-        </p:spPr>
-        <p:style>
-          <a:lnRef idx="2">
-            <a:schemeClr val="accent6"/>
-          </a:lnRef>
-          <a:fillRef idx="1">
-            <a:schemeClr val="lt1"/>
-          </a:fillRef>
-          <a:effectRef idx="0">
-            <a:schemeClr val="accent6"/>
-          </a:effectRef>
-          <a:fontRef idx="minor">
-            <a:schemeClr val="dk1"/>
-          </a:fontRef>
-        </p:style>
-        <p:txBody>
-          <a:bodyPr rtlCol="0" anchor="ctr"/>
-          <a:lstStyle/>
-          <a:p>
-            <a:pPr algn="ctr"/>
-            <a:r>
-              <a:rPr lang="es-ES" sz="1050" dirty="0" smtClean="0">
-                <a:solidFill>
-                  <a:schemeClr val="bg1"/>
-                </a:solidFill>
-              </a:rPr>
-              <a:t>números </a:t>
-            </a:r>
-            <a:r>
-              <a:rPr lang="es-ES" sz="1050" dirty="0" smtClean="0">
-                <a:solidFill>
-                  <a:schemeClr val="bg1"/>
-                </a:solidFill>
-              </a:rPr>
-              <a:t>signados</a:t>
-            </a:r>
-            <a:endParaRPr lang="es-ES" sz="1050" dirty="0">
-              <a:solidFill>
-                <a:schemeClr val="bg1"/>
-              </a:solidFill>
-            </a:endParaRPr>
           </a:p>
         </p:txBody>
       </p:sp>
       <p:cxnSp>
         <p:nvCxnSpPr>
           <p:cNvPr id="166" name="Conector angular 165"/>
-          <p:cNvCxnSpPr>
-            <a:endCxn id="165" idx="0"/>
-          </p:cNvCxnSpPr>
+          <p:cNvCxnSpPr/>
           <p:nvPr/>
         </p:nvCxnSpPr>
         <p:spPr>
           <a:xfrm rot="5400000">
-            <a:off x="1090064" y="2735062"/>
+            <a:off x="1062509" y="2267791"/>
             <a:ext cx="143029" cy="1"/>
           </a:xfrm>
           <a:prstGeom prst="bentConnector3">
@@ -2379,8 +1602,8 @@
         </p:nvSpPr>
         <p:spPr>
           <a:xfrm>
-            <a:off x="436719" y="3237555"/>
-            <a:ext cx="1382135" cy="230832"/>
+            <a:off x="725221" y="3238499"/>
+            <a:ext cx="902195" cy="215444"/>
           </a:xfrm>
           <a:prstGeom prst="rect">
             <a:avLst/>
@@ -2395,14 +1618,10 @@
           <a:p>
             <a:pPr algn="ctr"/>
             <a:r>
-              <a:rPr lang="es-ES" sz="900" dirty="0" smtClean="0"/>
-              <a:t>que </a:t>
-            </a:r>
-            <a:r>
-              <a:rPr lang="es-ES" sz="900" dirty="0" smtClean="0"/>
-              <a:t>son los</a:t>
-            </a:r>
-            <a:endParaRPr lang="es-ES" sz="900" dirty="0"/>
+              <a:rPr lang="es-ES" sz="800" dirty="0" smtClean="0"/>
+              <a:t>se escriben</a:t>
+            </a:r>
+            <a:endParaRPr lang="es-ES" sz="800" dirty="0"/>
           </a:p>
         </p:txBody>
       </p:sp>
@@ -2415,16 +1634,12 @@
         <p:spPr>
           <a:xfrm>
             <a:off x="599204" y="3541892"/>
-            <a:ext cx="1126831" cy="1099668"/>
+            <a:ext cx="1126831" cy="618126"/>
           </a:xfrm>
           <a:prstGeom prst="rect">
             <a:avLst/>
           </a:prstGeom>
-          <a:solidFill>
-            <a:schemeClr val="bg2">
-              <a:lumMod val="90000"/>
-            </a:schemeClr>
-          </a:solidFill>
+          <a:noFill/>
           <a:ln>
             <a:solidFill>
               <a:schemeClr val="tx1"/>
@@ -2451,22 +1666,46 @@
           <a:p>
             <a:pPr algn="ctr"/>
             <a:r>
-              <a:rPr lang="es-ES" sz="900" dirty="0" smtClean="0">
+              <a:rPr lang="es-ES" sz="800" dirty="0" smtClean="0">
                 <a:solidFill>
                   <a:schemeClr val="tx1"/>
                 </a:solidFill>
               </a:rPr>
-              <a:t>números </a:t>
-            </a:r>
-            <a:r>
-              <a:rPr lang="es-ES" sz="900" dirty="0" smtClean="0">
+              <a:t>utilizando números </a:t>
+            </a:r>
+            <a:r>
+              <a:rPr lang="es-ES" sz="800" dirty="0" smtClean="0">
                 <a:solidFill>
                   <a:schemeClr val="tx1"/>
                 </a:solidFill>
               </a:rPr>
-              <a:t>naturales precedidos del signo más (+) y números que indican lo opuesto, precedidos del signo menos (‒).</a:t>
-            </a:r>
-            <a:endParaRPr lang="es-ES" sz="900" dirty="0">
+              <a:t>naturales precedidos del signo más (+) </a:t>
+            </a:r>
+            <a:r>
+              <a:rPr lang="es-ES" sz="800" dirty="0" smtClean="0">
+                <a:solidFill>
+                  <a:schemeClr val="tx1"/>
+                </a:solidFill>
+              </a:rPr>
+              <a:t>o del </a:t>
+            </a:r>
+            <a:r>
+              <a:rPr lang="es-ES" sz="800" dirty="0" smtClean="0">
+                <a:solidFill>
+                  <a:schemeClr val="tx1"/>
+                </a:solidFill>
+              </a:rPr>
+              <a:t>signo menos </a:t>
+            </a:r>
+            <a:r>
+              <a:rPr lang="es-ES" sz="800" dirty="0" smtClean="0">
+                <a:solidFill>
+                  <a:schemeClr val="tx1"/>
+                </a:solidFill>
+              </a:rPr>
+              <a:t>(‒)</a:t>
+            </a:r>
+            <a:endParaRPr lang="es-ES" sz="800" dirty="0">
               <a:solidFill>
                 <a:schemeClr val="tx1"/>
               </a:solidFill>
@@ -2476,92 +1715,20 @@
       </p:sp>
       <p:cxnSp>
         <p:nvCxnSpPr>
-          <p:cNvPr id="225" name="Conector angular 224"/>
-          <p:cNvCxnSpPr/>
+          <p:cNvPr id="294" name="Conector angular 293"/>
+          <p:cNvCxnSpPr>
+            <a:endCxn id="144" idx="0"/>
+          </p:cNvCxnSpPr>
           <p:nvPr/>
         </p:nvCxnSpPr>
         <p:spPr>
           <a:xfrm rot="5400000">
-            <a:off x="3250075" y="2164430"/>
-            <a:ext cx="111551" cy="1102"/>
+            <a:off x="1080098" y="1879919"/>
+            <a:ext cx="162688" cy="41036"/>
           </a:xfrm>
           <a:prstGeom prst="bentConnector3">
             <a:avLst>
-              <a:gd name="adj1" fmla="val 50000"/>
-            </a:avLst>
-          </a:prstGeom>
-          <a:ln w="12700">
-            <a:solidFill>
-              <a:schemeClr val="tx1"/>
-            </a:solidFill>
-          </a:ln>
-        </p:spPr>
-        <p:style>
-          <a:lnRef idx="1">
-            <a:schemeClr val="accent1"/>
-          </a:lnRef>
-          <a:fillRef idx="0">
-            <a:schemeClr val="accent1"/>
-          </a:fillRef>
-          <a:effectRef idx="0">
-            <a:schemeClr val="accent1"/>
-          </a:effectRef>
-          <a:fontRef idx="minor">
-            <a:schemeClr val="tx1"/>
-          </a:fontRef>
-        </p:style>
-      </p:cxnSp>
-      <p:cxnSp>
-        <p:nvCxnSpPr>
-          <p:cNvPr id="240" name="Conector angular 239"/>
-          <p:cNvCxnSpPr/>
-          <p:nvPr/>
-        </p:nvCxnSpPr>
-        <p:spPr>
-          <a:xfrm rot="10800000" flipV="1">
-            <a:off x="2302170" y="2212613"/>
-            <a:ext cx="983371" cy="98776"/>
-          </a:xfrm>
-          <a:prstGeom prst="bentConnector3">
-            <a:avLst>
-              <a:gd name="adj1" fmla="val 101659"/>
-            </a:avLst>
-          </a:prstGeom>
-          <a:ln w="12700">
-            <a:solidFill>
-              <a:schemeClr val="tx1"/>
-            </a:solidFill>
-          </a:ln>
-        </p:spPr>
-        <p:style>
-          <a:lnRef idx="1">
-            <a:schemeClr val="accent1"/>
-          </a:lnRef>
-          <a:fillRef idx="0">
-            <a:schemeClr val="accent1"/>
-          </a:fillRef>
-          <a:effectRef idx="0">
-            <a:schemeClr val="accent1"/>
-          </a:effectRef>
-          <a:fontRef idx="minor">
-            <a:schemeClr val="tx1"/>
-          </a:fontRef>
-        </p:style>
-      </p:cxnSp>
-      <p:cxnSp>
-        <p:nvCxnSpPr>
-          <p:cNvPr id="294" name="Conector angular 293"/>
-          <p:cNvCxnSpPr/>
-          <p:nvPr/>
-        </p:nvCxnSpPr>
-        <p:spPr>
-          <a:xfrm rot="5400000">
-            <a:off x="1121096" y="1931066"/>
-            <a:ext cx="111551" cy="1102"/>
-          </a:xfrm>
-          <a:prstGeom prst="bentConnector3">
-            <a:avLst>
-              <a:gd name="adj1" fmla="val 50000"/>
+              <a:gd name="adj1" fmla="val 12250"/>
             </a:avLst>
           </a:prstGeom>
           <a:ln w="12700">
@@ -2667,17 +1834,13 @@
         </p:nvSpPr>
         <p:spPr>
           <a:xfrm>
-            <a:off x="3371107" y="2558799"/>
-            <a:ext cx="1122431" cy="343441"/>
+            <a:off x="2296701" y="3237391"/>
+            <a:ext cx="1122431" cy="890186"/>
           </a:xfrm>
           <a:prstGeom prst="rect">
             <a:avLst/>
           </a:prstGeom>
-          <a:solidFill>
-            <a:schemeClr val="bg2">
-              <a:lumMod val="90000"/>
-            </a:schemeClr>
-          </a:solidFill>
+          <a:noFill/>
           <a:ln>
             <a:solidFill>
               <a:schemeClr val="tx1"/>
@@ -2704,14 +1867,30 @@
           <a:p>
             <a:pPr algn="ctr"/>
             <a:r>
-              <a:rPr lang="es-ES" sz="900" dirty="0" smtClean="0">
+              <a:rPr lang="es-ES" sz="800" dirty="0" smtClean="0">
                 <a:solidFill>
                   <a:schemeClr val="tx1"/>
                 </a:solidFill>
               </a:rPr>
-              <a:t>La recta numérica</a:t>
-            </a:r>
-            <a:endParaRPr lang="es-ES" sz="900" dirty="0">
+              <a:t>en una </a:t>
+            </a:r>
+            <a:r>
+              <a:rPr lang="es-ES" sz="800" dirty="0" smtClean="0">
+                <a:solidFill>
+                  <a:schemeClr val="tx1"/>
+                </a:solidFill>
+              </a:rPr>
+              <a:t>recta </a:t>
+            </a:r>
+            <a:r>
+              <a:rPr lang="es-ES" sz="800" dirty="0" smtClean="0">
+                <a:solidFill>
+                  <a:schemeClr val="tx1"/>
+                </a:solidFill>
+              </a:rPr>
+              <a:t>numérica tomando como referencia el número 0, a la derecha se ubican los positivos y a la izquierda los positivos</a:t>
+            </a:r>
+            <a:endParaRPr lang="es-ES" sz="800" dirty="0">
               <a:solidFill>
                 <a:schemeClr val="tx1"/>
               </a:solidFill>
@@ -2727,8 +1906,8 @@
         </p:nvSpPr>
         <p:spPr>
           <a:xfrm>
-            <a:off x="7816868" y="918002"/>
-            <a:ext cx="1124746" cy="439782"/>
+            <a:off x="7248971" y="621229"/>
+            <a:ext cx="1124746" cy="353240"/>
           </a:xfrm>
           <a:prstGeom prst="rect">
             <a:avLst/>
@@ -2770,11 +1949,7 @@
             <a:pPr algn="ctr"/>
             <a:r>
               <a:rPr lang="es-ES" sz="1200" b="1" dirty="0" smtClean="0"/>
-              <a:t>las </a:t>
-            </a:r>
-            <a:r>
-              <a:rPr lang="es-ES" sz="1200" b="1" dirty="0" smtClean="0"/>
-              <a:t>matemáticas</a:t>
+              <a:t>Aplicaciones</a:t>
             </a:r>
             <a:endParaRPr lang="es-ES" sz="1200" b="1" dirty="0"/>
           </a:p>
@@ -2788,8 +1963,8 @@
         </p:nvSpPr>
         <p:spPr>
           <a:xfrm>
-            <a:off x="4726936" y="1845919"/>
-            <a:ext cx="1233107" cy="1123704"/>
+            <a:off x="4164411" y="1471703"/>
+            <a:ext cx="1021699" cy="730679"/>
           </a:xfrm>
           <a:prstGeom prst="rect">
             <a:avLst/>
@@ -2820,28 +1995,20 @@
           </a:fontRef>
         </p:style>
         <p:txBody>
-          <a:bodyPr rtlCol="0" anchor="ctr"/>
+          <a:bodyPr rtlCol="0" anchor="t"/>
           <a:lstStyle/>
           <a:p>
             <a:pPr algn="ctr"/>
             <a:r>
-              <a:rPr lang="es-ES" sz="1050" dirty="0" smtClean="0">
+              <a:rPr lang="es-ES" sz="900" dirty="0" smtClean="0">
                 <a:solidFill>
                   <a:schemeClr val="bg1"/>
                 </a:solidFill>
               </a:rPr>
-              <a:t>la distancia </a:t>
-            </a:r>
-            <a:r>
-              <a:rPr lang="es-ES" sz="1050" dirty="0" smtClean="0">
-                <a:solidFill>
-                  <a:schemeClr val="bg1"/>
-                </a:solidFill>
-              </a:rPr>
-              <a:t>que </a:t>
-            </a:r>
-            <a:r>
-              <a:rPr lang="es-ES" sz="1050" dirty="0">
+              <a:t>la distancia que </a:t>
+            </a:r>
+            <a:r>
+              <a:rPr lang="es-ES" sz="900" dirty="0">
                 <a:solidFill>
                   <a:schemeClr val="bg1"/>
                 </a:solidFill>
@@ -2849,7 +2016,7 @@
               <a:t>hay </a:t>
             </a:r>
             <a:r>
-              <a:rPr lang="es-ES" sz="1050" dirty="0" smtClean="0">
+              <a:rPr lang="es-ES" sz="900" dirty="0" smtClean="0">
                 <a:solidFill>
                   <a:schemeClr val="bg1"/>
                 </a:solidFill>
@@ -2857,7 +2024,7 @@
               <a:t>entre el </a:t>
             </a:r>
             <a:r>
-              <a:rPr lang="es-ES" sz="1050" dirty="0">
+              <a:rPr lang="es-ES" sz="900" dirty="0">
                 <a:solidFill>
                   <a:schemeClr val="bg1"/>
                 </a:solidFill>
@@ -2891,7 +2058,7 @@
         </p:nvSpPr>
         <p:spPr>
           <a:xfrm>
-            <a:off x="6260183" y="918002"/>
+            <a:off x="5693487" y="598428"/>
             <a:ext cx="1124746" cy="439782"/>
           </a:xfrm>
           <a:prstGeom prst="rect">
@@ -2934,7 +2101,7 @@
             <a:pPr algn="ctr"/>
             <a:r>
               <a:rPr lang="es-ES" sz="1200" b="1" dirty="0" smtClean="0"/>
-              <a:t>relaciones </a:t>
+              <a:t>Relaciones </a:t>
             </a:r>
             <a:r>
               <a:rPr lang="es-ES" sz="1200" b="1" dirty="0" smtClean="0"/>
@@ -2952,7 +2119,7 @@
         </p:nvSpPr>
         <p:spPr>
           <a:xfrm>
-            <a:off x="6244438" y="1434710"/>
+            <a:off x="5707781" y="1187519"/>
             <a:ext cx="1117174" cy="230832"/>
           </a:xfrm>
           <a:prstGeom prst="rect">
@@ -2969,11 +2136,7 @@
             <a:pPr algn="ctr"/>
             <a:r>
               <a:rPr lang="es-ES" sz="900" dirty="0" smtClean="0"/>
-              <a:t>como </a:t>
-            </a:r>
-            <a:r>
-              <a:rPr lang="es-ES" sz="900" dirty="0" smtClean="0"/>
-              <a:t>ser</a:t>
+              <a:t>tales como</a:t>
             </a:r>
             <a:endParaRPr lang="es-ES" sz="900" dirty="0"/>
           </a:p>
@@ -2981,14 +2144,82 @@
       </p:sp>
       <p:sp>
         <p:nvSpPr>
-          <p:cNvPr id="133" name="CuadroTexto 132" descr="Conector entre nodos" title="conector"/>
+          <p:cNvPr id="135" name="Rectángulo 134" descr="Nodo de segundo nivel" title="Nodo02"/>
+          <p:cNvSpPr/>
+          <p:nvPr/>
+        </p:nvSpPr>
+        <p:spPr>
+          <a:xfrm>
+            <a:off x="5777532" y="1459693"/>
+            <a:ext cx="690329" cy="274477"/>
+          </a:xfrm>
+          <a:prstGeom prst="rect">
+            <a:avLst/>
+          </a:prstGeom>
+          <a:solidFill>
+            <a:schemeClr val="bg2">
+              <a:lumMod val="50000"/>
+            </a:schemeClr>
+          </a:solidFill>
+          <a:ln>
+            <a:solidFill>
+              <a:schemeClr val="tx1"/>
+            </a:solidFill>
+          </a:ln>
+        </p:spPr>
+        <p:style>
+          <a:lnRef idx="2">
+            <a:schemeClr val="accent6"/>
+          </a:lnRef>
+          <a:fillRef idx="1">
+            <a:schemeClr val="lt1"/>
+          </a:fillRef>
+          <a:effectRef idx="0">
+            <a:schemeClr val="accent6"/>
+          </a:effectRef>
+          <a:fontRef idx="minor">
+            <a:schemeClr val="dk1"/>
+          </a:fontRef>
+        </p:style>
+        <p:txBody>
+          <a:bodyPr rtlCol="0" anchor="ctr"/>
+          <a:lstStyle/>
+          <a:p>
+            <a:pPr algn="ctr"/>
+            <a:r>
+              <a:rPr lang="es-ES" sz="800" dirty="0" smtClean="0">
+                <a:solidFill>
+                  <a:schemeClr val="bg1"/>
+                </a:solidFill>
+              </a:rPr>
+              <a:t>mayor </a:t>
+            </a:r>
+            <a:r>
+              <a:rPr lang="es-ES" sz="800" dirty="0" smtClean="0">
+                <a:solidFill>
+                  <a:schemeClr val="bg1"/>
+                </a:solidFill>
+              </a:rPr>
+              <a:t>que</a:t>
+            </a:r>
+            <a:endParaRPr lang="es-ES" sz="800" dirty="0">
+              <a:solidFill>
+                <a:schemeClr val="bg1"/>
+              </a:solidFill>
+            </a:endParaRPr>
+          </a:p>
+        </p:txBody>
+      </p:sp>
+      <p:sp>
+        <p:nvSpPr>
+          <p:cNvPr id="137" name="CuadroTexto 136" descr="Conector entre nodos" title="conector"/>
           <p:cNvSpPr txBox="1"/>
           <p:nvPr/>
         </p:nvSpPr>
         <p:spPr>
           <a:xfrm>
-            <a:off x="6247232" y="635630"/>
-            <a:ext cx="1122431" cy="230832"/>
+            <a:off x="5767199" y="1822710"/>
+            <a:ext cx="654560" cy="215444"/>
           </a:xfrm>
           <a:prstGeom prst="rect">
             <a:avLst/>
@@ -3003,181 +2234,14 @@
           <a:p>
             <a:pPr algn="ctr"/>
             <a:r>
-              <a:rPr lang="es-ES" sz="900" dirty="0" smtClean="0"/>
-              <a:t>se establecen</a:t>
-            </a:r>
-            <a:endParaRPr lang="es-ES" sz="900" dirty="0"/>
-          </a:p>
-        </p:txBody>
-      </p:sp>
-      <p:cxnSp>
-        <p:nvCxnSpPr>
-          <p:cNvPr id="134" name="Conector angular 133"/>
-          <p:cNvCxnSpPr/>
-          <p:nvPr/>
-        </p:nvCxnSpPr>
-        <p:spPr>
-          <a:xfrm rot="16200000" flipV="1">
-            <a:off x="6782836" y="2549200"/>
-            <a:ext cx="126597" cy="877"/>
-          </a:xfrm>
-          <a:prstGeom prst="bentConnector3">
-            <a:avLst>
-              <a:gd name="adj1" fmla="val 50000"/>
-            </a:avLst>
-          </a:prstGeom>
-          <a:ln w="12700">
-            <a:solidFill>
-              <a:schemeClr val="tx1"/>
-            </a:solidFill>
-          </a:ln>
-        </p:spPr>
-        <p:style>
-          <a:lnRef idx="1">
-            <a:schemeClr val="accent1"/>
-          </a:lnRef>
-          <a:fillRef idx="0">
-            <a:schemeClr val="accent1"/>
-          </a:fillRef>
-          <a:effectRef idx="0">
-            <a:schemeClr val="accent1"/>
-          </a:effectRef>
-          <a:fontRef idx="minor">
-            <a:schemeClr val="tx1"/>
-          </a:fontRef>
-        </p:style>
-      </p:cxnSp>
-      <p:sp>
-        <p:nvSpPr>
-          <p:cNvPr id="135" name="Rectángulo 134" descr="Nodo de segundo nivel" title="Nodo02"/>
-          <p:cNvSpPr/>
-          <p:nvPr/>
-        </p:nvSpPr>
-        <p:spPr>
-          <a:xfrm>
-            <a:off x="6260183" y="1706046"/>
-            <a:ext cx="1124746" cy="357473"/>
-          </a:xfrm>
-          <a:prstGeom prst="rect">
-            <a:avLst/>
-          </a:prstGeom>
-          <a:solidFill>
-            <a:schemeClr val="bg2">
-              <a:lumMod val="50000"/>
-            </a:schemeClr>
-          </a:solidFill>
-          <a:ln>
-            <a:solidFill>
-              <a:schemeClr val="tx1"/>
-            </a:solidFill>
-          </a:ln>
-        </p:spPr>
-        <p:style>
-          <a:lnRef idx="2">
-            <a:schemeClr val="accent6"/>
-          </a:lnRef>
-          <a:fillRef idx="1">
-            <a:schemeClr val="lt1"/>
-          </a:fillRef>
-          <a:effectRef idx="0">
-            <a:schemeClr val="accent6"/>
-          </a:effectRef>
-          <a:fontRef idx="minor">
-            <a:schemeClr val="dk1"/>
-          </a:fontRef>
-        </p:style>
-        <p:txBody>
-          <a:bodyPr rtlCol="0" anchor="ctr"/>
-          <a:lstStyle/>
-          <a:p>
-            <a:pPr algn="ctr"/>
-            <a:r>
-              <a:rPr lang="es-ES" sz="1050" dirty="0" smtClean="0">
-                <a:solidFill>
-                  <a:schemeClr val="bg1"/>
-                </a:solidFill>
-              </a:rPr>
-              <a:t>Mayor que</a:t>
-            </a:r>
-            <a:endParaRPr lang="es-ES" sz="1050" dirty="0">
-              <a:solidFill>
-                <a:schemeClr val="bg1"/>
-              </a:solidFill>
-            </a:endParaRPr>
-          </a:p>
-        </p:txBody>
-      </p:sp>
-      <p:cxnSp>
-        <p:nvCxnSpPr>
-          <p:cNvPr id="136" name="Conector angular 135"/>
-          <p:cNvCxnSpPr>
-            <a:endCxn id="137" idx="0"/>
-          </p:cNvCxnSpPr>
-          <p:nvPr/>
-        </p:nvCxnSpPr>
-        <p:spPr>
-          <a:xfrm rot="16200000" flipH="1">
-            <a:off x="6731726" y="2168950"/>
-            <a:ext cx="184490" cy="4741"/>
-          </a:xfrm>
-          <a:prstGeom prst="bentConnector3">
-            <a:avLst>
-              <a:gd name="adj1" fmla="val 105071"/>
-            </a:avLst>
-          </a:prstGeom>
-          <a:ln w="12700">
-            <a:solidFill>
-              <a:schemeClr val="tx1"/>
-            </a:solidFill>
-          </a:ln>
-        </p:spPr>
-        <p:style>
-          <a:lnRef idx="1">
-            <a:schemeClr val="accent1"/>
-          </a:lnRef>
-          <a:fillRef idx="0">
-            <a:schemeClr val="accent1"/>
-          </a:fillRef>
-          <a:effectRef idx="0">
-            <a:schemeClr val="accent1"/>
-          </a:effectRef>
-          <a:fontRef idx="minor">
-            <a:schemeClr val="tx1"/>
-          </a:fontRef>
-        </p:style>
-      </p:cxnSp>
-      <p:sp>
-        <p:nvSpPr>
-          <p:cNvPr id="137" name="CuadroTexto 136" descr="Conector entre nodos" title="conector"/>
-          <p:cNvSpPr txBox="1"/>
-          <p:nvPr/>
-        </p:nvSpPr>
-        <p:spPr>
-          <a:xfrm>
-            <a:off x="6267755" y="2263566"/>
-            <a:ext cx="1117174" cy="230836"/>
-          </a:xfrm>
-          <a:prstGeom prst="rect">
-            <a:avLst/>
-          </a:prstGeom>
-          <a:noFill/>
-        </p:spPr>
-        <p:txBody>
-          <a:bodyPr wrap="square" rtlCol="0">
-            <a:spAutoFit/>
-          </a:bodyPr>
-          <a:lstStyle/>
-          <a:p>
-            <a:pPr algn="ctr"/>
-            <a:r>
-              <a:rPr lang="es-ES" sz="900" dirty="0" smtClean="0"/>
-              <a:t>para </a:t>
-            </a:r>
-            <a:r>
-              <a:rPr lang="es-ES" sz="900" dirty="0" smtClean="0"/>
+              <a:rPr lang="es-ES" sz="800" dirty="0" smtClean="0"/>
+              <a:t>en </a:t>
+            </a:r>
+            <a:r>
+              <a:rPr lang="es-ES" sz="800" dirty="0" smtClean="0"/>
               <a:t>la cual</a:t>
             </a:r>
-            <a:endParaRPr lang="es-ES" sz="900" dirty="0"/>
+            <a:endParaRPr lang="es-ES" sz="800" dirty="0"/>
           </a:p>
         </p:txBody>
       </p:sp>
@@ -3189,8 +2253,8 @@
         </p:nvSpPr>
         <p:spPr>
           <a:xfrm>
-            <a:off x="6232012" y="2612937"/>
-            <a:ext cx="1246566" cy="583042"/>
+            <a:off x="5700830" y="2236571"/>
+            <a:ext cx="1051034" cy="649274"/>
           </a:xfrm>
           <a:prstGeom prst="rect">
             <a:avLst/>
@@ -3226,14 +2290,38 @@
           <a:p>
             <a:pPr algn="ctr"/>
             <a:r>
-              <a:rPr lang="es-ES" sz="900" dirty="0" smtClean="0">
+              <a:rPr lang="es-ES" sz="800" dirty="0" smtClean="0">
                 <a:solidFill>
                   <a:schemeClr val="tx1"/>
                 </a:solidFill>
               </a:rPr>
-              <a:t>El número entero que esté más a la derecha de otro será el mayor.</a:t>
-            </a:r>
-            <a:endParaRPr lang="es-ES" sz="900" dirty="0">
+              <a:t>en la recta numérica </a:t>
+            </a:r>
+            <a:r>
+              <a:rPr lang="es-ES" sz="800" dirty="0" smtClean="0">
+                <a:solidFill>
+                  <a:schemeClr val="tx1"/>
+                </a:solidFill>
+              </a:rPr>
+              <a:t>el </a:t>
+            </a:r>
+            <a:r>
+              <a:rPr lang="es-ES" sz="800" dirty="0" smtClean="0">
+                <a:solidFill>
+                  <a:schemeClr val="tx1"/>
+                </a:solidFill>
+              </a:rPr>
+              <a:t>número entero que esté más a la derecha de otro será el </a:t>
+            </a:r>
+            <a:r>
+              <a:rPr lang="es-ES" sz="800" dirty="0" smtClean="0">
+                <a:solidFill>
+                  <a:schemeClr val="tx1"/>
+                </a:solidFill>
+              </a:rPr>
+              <a:t>mayor</a:t>
+            </a:r>
+            <a:endParaRPr lang="es-ES" sz="800" dirty="0">
               <a:solidFill>
                 <a:schemeClr val="tx1"/>
               </a:solidFill>
@@ -3251,7 +2339,7 @@
         </p:nvCxnSpPr>
         <p:spPr>
           <a:xfrm rot="5400000" flipH="1" flipV="1">
-            <a:off x="6643069" y="4423945"/>
+            <a:off x="5918272" y="3952968"/>
             <a:ext cx="419691" cy="12700"/>
           </a:xfrm>
           <a:prstGeom prst="bentConnector3">
@@ -3288,8 +2376,8 @@
         </p:nvSpPr>
         <p:spPr>
           <a:xfrm>
-            <a:off x="6286755" y="3425743"/>
-            <a:ext cx="1124746" cy="357473"/>
+            <a:off x="5750228" y="3070336"/>
+            <a:ext cx="732739" cy="226176"/>
           </a:xfrm>
           <a:prstGeom prst="rect">
             <a:avLst/>
@@ -3325,22 +2413,14 @@
           <a:p>
             <a:pPr algn="ctr"/>
             <a:r>
-              <a:rPr lang="es-ES" sz="1050" dirty="0" smtClean="0">
+              <a:rPr lang="es-ES" sz="800" dirty="0" smtClean="0">
                 <a:solidFill>
                   <a:schemeClr val="bg1"/>
                 </a:solidFill>
               </a:rPr>
-              <a:t>menor </a:t>
-            </a:r>
-            <a:r>
-              <a:rPr lang="es-ES" sz="1050" dirty="0" smtClean="0">
-                <a:solidFill>
-                  <a:schemeClr val="bg1"/>
-                </a:solidFill>
-              </a:rPr>
-              <a:t>que</a:t>
-            </a:r>
-            <a:endParaRPr lang="es-ES" sz="1050" dirty="0">
+              <a:t>menor que</a:t>
+            </a:r>
+            <a:endParaRPr lang="es-ES" sz="800" dirty="0">
               <a:solidFill>
                 <a:schemeClr val="bg1"/>
               </a:solidFill>
@@ -3351,14 +2431,12 @@
       <p:cxnSp>
         <p:nvCxnSpPr>
           <p:cNvPr id="141" name="Conector angular 140"/>
-          <p:cNvCxnSpPr>
-            <a:endCxn id="142" idx="0"/>
-          </p:cNvCxnSpPr>
+          <p:cNvCxnSpPr/>
           <p:nvPr/>
         </p:nvCxnSpPr>
         <p:spPr>
           <a:xfrm rot="16200000" flipH="1">
-            <a:off x="6758298" y="3888647"/>
+            <a:off x="6019853" y="3400311"/>
             <a:ext cx="184490" cy="4741"/>
           </a:xfrm>
           <a:prstGeom prst="bentConnector3">
@@ -3395,7 +2473,7 @@
         </p:nvSpPr>
         <p:spPr>
           <a:xfrm>
-            <a:off x="6294327" y="3983263"/>
+            <a:off x="5569530" y="3512286"/>
             <a:ext cx="1117174" cy="230836"/>
           </a:xfrm>
           <a:prstGeom prst="rect">
@@ -3412,11 +2490,11 @@
             <a:pPr algn="ctr"/>
             <a:r>
               <a:rPr lang="es-ES" sz="900" dirty="0" smtClean="0"/>
-              <a:t>para </a:t>
+              <a:t>en la </a:t>
             </a:r>
             <a:r>
               <a:rPr lang="es-ES" sz="900" dirty="0" smtClean="0"/>
-              <a:t>la cual</a:t>
+              <a:t>cual</a:t>
             </a:r>
             <a:endParaRPr lang="es-ES" sz="900" dirty="0"/>
           </a:p>
@@ -3430,7 +2508,7 @@
         </p:nvSpPr>
         <p:spPr>
           <a:xfrm>
-            <a:off x="6267755" y="4414146"/>
+            <a:off x="5651837" y="3958896"/>
             <a:ext cx="1246566" cy="583042"/>
           </a:xfrm>
           <a:prstGeom prst="rect">
@@ -3467,12 +2545,28 @@
           <a:p>
             <a:pPr algn="ctr"/>
             <a:r>
+              <a:rPr lang="es-ES" sz="900" dirty="0">
+                <a:solidFill>
+                  <a:schemeClr val="tx1"/>
+                </a:solidFill>
+              </a:rPr>
+              <a:t>en la recta numérica el número entero que esté más a la </a:t>
+            </a:r>
+            <a:r>
               <a:rPr lang="es-ES" sz="900" dirty="0" smtClean="0">
                 <a:solidFill>
                   <a:schemeClr val="tx1"/>
                 </a:solidFill>
               </a:rPr>
-              <a:t>ll </a:t>
+              <a:t>izquierda de </a:t>
+            </a:r>
+            <a:r>
+              <a:rPr lang="es-ES" sz="900" dirty="0">
+                <a:solidFill>
+                  <a:schemeClr val="tx1"/>
+                </a:solidFill>
+              </a:rPr>
+              <a:t>otro será el </a:t>
             </a:r>
             <a:r>
               <a:rPr lang="es-ES" sz="900" dirty="0" smtClean="0">
@@ -3480,9 +2574,836 @@
                   <a:schemeClr val="tx1"/>
                 </a:solidFill>
               </a:rPr>
-              <a:t>número entero que esté más a la izquierda de otro será el menor.</a:t>
+              <a:t>menor</a:t>
             </a:r>
             <a:endParaRPr lang="es-ES" sz="900" dirty="0">
+              <a:solidFill>
+                <a:schemeClr val="tx1"/>
+              </a:solidFill>
+            </a:endParaRPr>
+          </a:p>
+        </p:txBody>
+      </p:sp>
+      <p:sp>
+        <p:nvSpPr>
+          <p:cNvPr id="178" name="CuadroTexto 177" descr="Conector entre nodos" title="conector"/>
+          <p:cNvSpPr txBox="1"/>
+          <p:nvPr/>
+        </p:nvSpPr>
+        <p:spPr>
+          <a:xfrm>
+            <a:off x="7608362" y="1120295"/>
+            <a:ext cx="441766" cy="230836"/>
+          </a:xfrm>
+          <a:prstGeom prst="rect">
+            <a:avLst/>
+          </a:prstGeom>
+          <a:noFill/>
+        </p:spPr>
+        <p:txBody>
+          <a:bodyPr wrap="square" rtlCol="0">
+            <a:spAutoFit/>
+          </a:bodyPr>
+          <a:lstStyle/>
+          <a:p>
+            <a:pPr algn="ctr"/>
+            <a:r>
+              <a:rPr lang="es-ES" sz="900" dirty="0" smtClean="0"/>
+              <a:t>en</a:t>
+            </a:r>
+            <a:endParaRPr lang="es-ES" sz="900" dirty="0"/>
+          </a:p>
+        </p:txBody>
+      </p:sp>
+      <p:cxnSp>
+        <p:nvCxnSpPr>
+          <p:cNvPr id="230" name="Conector recto 229"/>
+          <p:cNvCxnSpPr/>
+          <p:nvPr/>
+        </p:nvCxnSpPr>
+        <p:spPr>
+          <a:xfrm>
+            <a:off x="3240348" y="1434122"/>
+            <a:ext cx="0" cy="130629"/>
+          </a:xfrm>
+          <a:prstGeom prst="line">
+            <a:avLst/>
+          </a:prstGeom>
+          <a:ln>
+            <a:solidFill>
+              <a:schemeClr val="tx1"/>
+            </a:solidFill>
+          </a:ln>
+        </p:spPr>
+        <p:style>
+          <a:lnRef idx="1">
+            <a:schemeClr val="accent1"/>
+          </a:lnRef>
+          <a:fillRef idx="0">
+            <a:schemeClr val="accent1"/>
+          </a:fillRef>
+          <a:effectRef idx="0">
+            <a:schemeClr val="accent1"/>
+          </a:effectRef>
+          <a:fontRef idx="minor">
+            <a:schemeClr val="tx1"/>
+          </a:fontRef>
+        </p:style>
+      </p:cxnSp>
+      <p:cxnSp>
+        <p:nvCxnSpPr>
+          <p:cNvPr id="231" name="Conector recto 230"/>
+          <p:cNvCxnSpPr/>
+          <p:nvPr/>
+        </p:nvCxnSpPr>
+        <p:spPr>
+          <a:xfrm>
+            <a:off x="3240348" y="1619643"/>
+            <a:ext cx="0" cy="130629"/>
+          </a:xfrm>
+          <a:prstGeom prst="line">
+            <a:avLst/>
+          </a:prstGeom>
+          <a:ln>
+            <a:solidFill>
+              <a:schemeClr val="tx1"/>
+            </a:solidFill>
+          </a:ln>
+        </p:spPr>
+        <p:style>
+          <a:lnRef idx="1">
+            <a:schemeClr val="accent1"/>
+          </a:lnRef>
+          <a:fillRef idx="0">
+            <a:schemeClr val="accent1"/>
+          </a:fillRef>
+          <a:effectRef idx="0">
+            <a:schemeClr val="accent1"/>
+          </a:effectRef>
+          <a:fontRef idx="minor">
+            <a:schemeClr val="tx1"/>
+          </a:fontRef>
+        </p:style>
+      </p:cxnSp>
+      <p:cxnSp>
+        <p:nvCxnSpPr>
+          <p:cNvPr id="118" name="Conector angular 117"/>
+          <p:cNvCxnSpPr/>
+          <p:nvPr/>
+        </p:nvCxnSpPr>
+        <p:spPr>
+          <a:xfrm rot="16200000" flipH="1">
+            <a:off x="6236735" y="-835534"/>
+            <a:ext cx="26982" cy="3122236"/>
+          </a:xfrm>
+          <a:prstGeom prst="bentConnector3">
+            <a:avLst>
+              <a:gd name="adj1" fmla="val -847231"/>
+            </a:avLst>
+          </a:prstGeom>
+          <a:ln/>
+        </p:spPr>
+        <p:style>
+          <a:lnRef idx="2">
+            <a:schemeClr val="dk1"/>
+          </a:lnRef>
+          <a:fillRef idx="0">
+            <a:schemeClr val="dk1"/>
+          </a:fillRef>
+          <a:effectRef idx="1">
+            <a:schemeClr val="dk1"/>
+          </a:effectRef>
+          <a:fontRef idx="minor">
+            <a:schemeClr val="tx1"/>
+          </a:fontRef>
+        </p:style>
+      </p:cxnSp>
+      <p:cxnSp>
+        <p:nvCxnSpPr>
+          <p:cNvPr id="236" name="Conector recto 235"/>
+          <p:cNvCxnSpPr/>
+          <p:nvPr/>
+        </p:nvCxnSpPr>
+        <p:spPr>
+          <a:xfrm>
+            <a:off x="2844169" y="514298"/>
+            <a:ext cx="0" cy="130629"/>
+          </a:xfrm>
+          <a:prstGeom prst="line">
+            <a:avLst/>
+          </a:prstGeom>
+          <a:ln>
+            <a:solidFill>
+              <a:schemeClr val="tx1"/>
+            </a:solidFill>
+          </a:ln>
+        </p:spPr>
+        <p:style>
+          <a:lnRef idx="1">
+            <a:schemeClr val="accent1"/>
+          </a:lnRef>
+          <a:fillRef idx="0">
+            <a:schemeClr val="accent1"/>
+          </a:fillRef>
+          <a:effectRef idx="0">
+            <a:schemeClr val="accent1"/>
+          </a:effectRef>
+          <a:fontRef idx="minor">
+            <a:schemeClr val="tx1"/>
+          </a:fontRef>
+        </p:style>
+      </p:cxnSp>
+      <p:sp>
+        <p:nvSpPr>
+          <p:cNvPr id="86" name="Rectángulo 85" descr="Nodo de tercer nivel" title="Nodo03"/>
+          <p:cNvSpPr/>
+          <p:nvPr/>
+        </p:nvSpPr>
+        <p:spPr>
+          <a:xfrm>
+            <a:off x="524551" y="2362266"/>
+            <a:ext cx="1246566" cy="748595"/>
+          </a:xfrm>
+          <a:prstGeom prst="rect">
+            <a:avLst/>
+          </a:prstGeom>
+          <a:solidFill>
+            <a:schemeClr val="bg2">
+              <a:lumMod val="90000"/>
+            </a:schemeClr>
+          </a:solidFill>
+          <a:ln>
+            <a:solidFill>
+              <a:schemeClr val="tx1"/>
+            </a:solidFill>
+          </a:ln>
+        </p:spPr>
+        <p:style>
+          <a:lnRef idx="2">
+            <a:schemeClr val="accent6"/>
+          </a:lnRef>
+          <a:fillRef idx="1">
+            <a:schemeClr val="lt1"/>
+          </a:fillRef>
+          <a:effectRef idx="0">
+            <a:schemeClr val="accent6"/>
+          </a:effectRef>
+          <a:fontRef idx="minor">
+            <a:schemeClr val="dk1"/>
+          </a:fontRef>
+        </p:style>
+        <p:txBody>
+          <a:bodyPr rtlCol="0" anchor="ctr"/>
+          <a:lstStyle/>
+          <a:p>
+            <a:pPr algn="ctr"/>
+            <a:r>
+              <a:rPr lang="es-ES" sz="800" dirty="0" smtClean="0">
+                <a:solidFill>
+                  <a:schemeClr val="tx1"/>
+                </a:solidFill>
+              </a:rPr>
+              <a:t>expresiones como antes, después, por encima, por debajo, más, </a:t>
+            </a:r>
+            <a:r>
+              <a:rPr lang="es-ES" sz="800" dirty="0" smtClean="0">
+                <a:solidFill>
+                  <a:schemeClr val="tx1"/>
+                </a:solidFill>
+              </a:rPr>
+              <a:t>menos</a:t>
+            </a:r>
+            <a:r>
+              <a:rPr lang="es-ES" sz="800" dirty="0">
+                <a:solidFill>
+                  <a:schemeClr val="tx1"/>
+                </a:solidFill>
+              </a:rPr>
+              <a:t>, ganancias, </a:t>
+            </a:r>
+            <a:r>
+              <a:rPr lang="es-ES" sz="800" dirty="0" smtClean="0">
+                <a:solidFill>
+                  <a:schemeClr val="tx1"/>
+                </a:solidFill>
+              </a:rPr>
+              <a:t>perdidas, </a:t>
+            </a:r>
+            <a:r>
+              <a:rPr lang="es-ES" sz="800" dirty="0">
+                <a:solidFill>
+                  <a:schemeClr val="tx1"/>
+                </a:solidFill>
+              </a:rPr>
+              <a:t>entre otras </a:t>
+            </a:r>
+            <a:endParaRPr lang="es-ES" sz="800" dirty="0">
+              <a:solidFill>
+                <a:schemeClr val="tx1"/>
+              </a:solidFill>
+            </a:endParaRPr>
+          </a:p>
+        </p:txBody>
+      </p:sp>
+      <p:sp>
+        <p:nvSpPr>
+          <p:cNvPr id="87" name="Rectángulo 86" descr="Nodo de segundo nivel" title="Nodo02"/>
+          <p:cNvSpPr/>
+          <p:nvPr/>
+        </p:nvSpPr>
+        <p:spPr>
+          <a:xfrm>
+            <a:off x="2187329" y="1436866"/>
+            <a:ext cx="1261796" cy="417653"/>
+          </a:xfrm>
+          <a:prstGeom prst="rect">
+            <a:avLst/>
+          </a:prstGeom>
+          <a:solidFill>
+            <a:schemeClr val="bg2">
+              <a:lumMod val="50000"/>
+            </a:schemeClr>
+          </a:solidFill>
+          <a:ln>
+            <a:solidFill>
+              <a:schemeClr val="tx1"/>
+            </a:solidFill>
+          </a:ln>
+        </p:spPr>
+        <p:style>
+          <a:lnRef idx="2">
+            <a:schemeClr val="accent6"/>
+          </a:lnRef>
+          <a:fillRef idx="1">
+            <a:schemeClr val="lt1"/>
+          </a:fillRef>
+          <a:effectRef idx="0">
+            <a:schemeClr val="accent6"/>
+          </a:effectRef>
+          <a:fontRef idx="minor">
+            <a:schemeClr val="dk1"/>
+          </a:fontRef>
+        </p:style>
+        <p:txBody>
+          <a:bodyPr rtlCol="0" anchor="ctr"/>
+          <a:lstStyle/>
+          <a:p>
+            <a:pPr algn="ctr"/>
+            <a:r>
+              <a:rPr lang="es-ES" sz="900" dirty="0" smtClean="0">
+                <a:solidFill>
+                  <a:schemeClr val="bg1"/>
+                </a:solidFill>
+              </a:rPr>
+              <a:t>Los números naturales, sus opuestos y el cero</a:t>
+            </a:r>
+            <a:endParaRPr lang="es-ES" sz="900" dirty="0">
+              <a:solidFill>
+                <a:schemeClr val="bg1"/>
+              </a:solidFill>
+            </a:endParaRPr>
+          </a:p>
+        </p:txBody>
+      </p:sp>
+      <p:sp>
+        <p:nvSpPr>
+          <p:cNvPr id="88" name="CuadroTexto 87" descr="Conector entre nodos" title="conector"/>
+          <p:cNvSpPr txBox="1"/>
+          <p:nvPr/>
+        </p:nvSpPr>
+        <p:spPr>
+          <a:xfrm>
+            <a:off x="2196453" y="1977723"/>
+            <a:ext cx="1179278" cy="230832"/>
+          </a:xfrm>
+          <a:prstGeom prst="rect">
+            <a:avLst/>
+          </a:prstGeom>
+          <a:noFill/>
+        </p:spPr>
+        <p:txBody>
+          <a:bodyPr wrap="square" rtlCol="0">
+            <a:spAutoFit/>
+          </a:bodyPr>
+          <a:lstStyle/>
+          <a:p>
+            <a:pPr algn="ctr"/>
+            <a:r>
+              <a:rPr lang="es-ES" sz="900" dirty="0" smtClean="0"/>
+              <a:t>se simboliza</a:t>
+            </a:r>
+            <a:endParaRPr lang="es-ES" sz="900" dirty="0"/>
+          </a:p>
+        </p:txBody>
+      </p:sp>
+      <p:sp>
+        <p:nvSpPr>
+          <p:cNvPr id="89" name="Rectángulo 88" descr="Nodo de tercer nivel" title="Nodo03"/>
+          <p:cNvSpPr/>
+          <p:nvPr/>
+        </p:nvSpPr>
+        <p:spPr>
+          <a:xfrm>
+            <a:off x="2041520" y="2355447"/>
+            <a:ext cx="1815635" cy="334763"/>
+          </a:xfrm>
+          <a:prstGeom prst="rect">
+            <a:avLst/>
+          </a:prstGeom>
+          <a:solidFill>
+            <a:schemeClr val="bg2">
+              <a:lumMod val="90000"/>
+            </a:schemeClr>
+          </a:solidFill>
+          <a:ln>
+            <a:solidFill>
+              <a:schemeClr val="tx1"/>
+            </a:solidFill>
+          </a:ln>
+        </p:spPr>
+        <p:style>
+          <a:lnRef idx="2">
+            <a:schemeClr val="accent6"/>
+          </a:lnRef>
+          <a:fillRef idx="1">
+            <a:schemeClr val="lt1"/>
+          </a:fillRef>
+          <a:effectRef idx="0">
+            <a:schemeClr val="accent6"/>
+          </a:effectRef>
+          <a:fontRef idx="minor">
+            <a:schemeClr val="dk1"/>
+          </a:fontRef>
+        </p:style>
+        <p:txBody>
+          <a:bodyPr rtlCol="0" anchor="ctr"/>
+          <a:lstStyle/>
+          <a:p>
+            <a:pPr algn="ctr"/>
+            <a:r>
+              <a:rPr lang="es-ES" sz="900" b="1" dirty="0">
+                <a:solidFill>
+                  <a:schemeClr val="tx1"/>
+                </a:solidFill>
+                <a:latin typeface="Cambria Math" panose="02040503050406030204" pitchFamily="18" charset="0"/>
+                <a:ea typeface="Cambria Math" panose="02040503050406030204" pitchFamily="18" charset="0"/>
+              </a:rPr>
+              <a:t>ℤ</a:t>
+            </a:r>
+            <a:r>
+              <a:rPr lang="es-ES" sz="900" dirty="0">
+                <a:solidFill>
+                  <a:schemeClr val="tx1"/>
+                </a:solidFill>
+              </a:rPr>
+              <a:t> = {… , -4, -3, -2, -1, 0, 1, 2, 3, 4,…}</a:t>
+            </a:r>
+            <a:endParaRPr lang="es-ES" sz="900" b="1" dirty="0">
+              <a:solidFill>
+                <a:schemeClr val="tx1"/>
+              </a:solidFill>
+            </a:endParaRPr>
+          </a:p>
+        </p:txBody>
+      </p:sp>
+      <p:sp>
+        <p:nvSpPr>
+          <p:cNvPr id="90" name="CuadroTexto 89" descr="Conector entre nodos" title="conector"/>
+          <p:cNvSpPr txBox="1"/>
+          <p:nvPr/>
+        </p:nvSpPr>
+        <p:spPr>
+          <a:xfrm>
+            <a:off x="2228588" y="2822864"/>
+            <a:ext cx="1179278" cy="230832"/>
+          </a:xfrm>
+          <a:prstGeom prst="rect">
+            <a:avLst/>
+          </a:prstGeom>
+          <a:noFill/>
+        </p:spPr>
+        <p:txBody>
+          <a:bodyPr wrap="square" rtlCol="0">
+            <a:spAutoFit/>
+          </a:bodyPr>
+          <a:lstStyle/>
+          <a:p>
+            <a:pPr algn="ctr"/>
+            <a:r>
+              <a:rPr lang="es-ES" sz="900" dirty="0" smtClean="0"/>
+              <a:t>se representan</a:t>
+            </a:r>
+            <a:endParaRPr lang="es-ES" sz="900" dirty="0"/>
+          </a:p>
+        </p:txBody>
+      </p:sp>
+      <p:sp>
+        <p:nvSpPr>
+          <p:cNvPr id="93" name="CuadroTexto 92" descr="Conector entre nodos" title="conector"/>
+          <p:cNvSpPr txBox="1"/>
+          <p:nvPr/>
+        </p:nvSpPr>
+        <p:spPr>
+          <a:xfrm>
+            <a:off x="4172594" y="2381276"/>
+            <a:ext cx="1117174" cy="230832"/>
+          </a:xfrm>
+          <a:prstGeom prst="rect">
+            <a:avLst/>
+          </a:prstGeom>
+          <a:noFill/>
+        </p:spPr>
+        <p:txBody>
+          <a:bodyPr wrap="square" rtlCol="0">
+            <a:spAutoFit/>
+          </a:bodyPr>
+          <a:lstStyle/>
+          <a:p>
+            <a:pPr algn="ctr"/>
+            <a:r>
+              <a:rPr lang="es-ES" sz="900" dirty="0" smtClean="0"/>
+              <a:t>por su definición</a:t>
+            </a:r>
+            <a:endParaRPr lang="es-ES" sz="900" dirty="0"/>
+          </a:p>
+        </p:txBody>
+      </p:sp>
+      <p:sp>
+        <p:nvSpPr>
+          <p:cNvPr id="94" name="Rectángulo 93" descr="Nodo de tercer nivel" title="Nodo03"/>
+          <p:cNvSpPr/>
+          <p:nvPr/>
+        </p:nvSpPr>
+        <p:spPr>
+          <a:xfrm>
+            <a:off x="4197541" y="2839267"/>
+            <a:ext cx="1060397" cy="334763"/>
+          </a:xfrm>
+          <a:prstGeom prst="rect">
+            <a:avLst/>
+          </a:prstGeom>
+          <a:solidFill>
+            <a:schemeClr val="bg2">
+              <a:lumMod val="90000"/>
+            </a:schemeClr>
+          </a:solidFill>
+          <a:ln>
+            <a:solidFill>
+              <a:schemeClr val="tx1"/>
+            </a:solidFill>
+          </a:ln>
+        </p:spPr>
+        <p:style>
+          <a:lnRef idx="2">
+            <a:schemeClr val="accent6"/>
+          </a:lnRef>
+          <a:fillRef idx="1">
+            <a:schemeClr val="lt1"/>
+          </a:fillRef>
+          <a:effectRef idx="0">
+            <a:schemeClr val="accent6"/>
+          </a:effectRef>
+          <a:fontRef idx="minor">
+            <a:schemeClr val="dk1"/>
+          </a:fontRef>
+        </p:style>
+        <p:txBody>
+          <a:bodyPr rtlCol="0" anchor="ctr"/>
+          <a:lstStyle/>
+          <a:p>
+            <a:pPr algn="ctr"/>
+            <a:r>
+              <a:rPr lang="es-ES" sz="900" dirty="0" smtClean="0">
+                <a:solidFill>
+                  <a:schemeClr val="tx1"/>
+                </a:solidFill>
+              </a:rPr>
+              <a:t>representa un valor positivo</a:t>
+            </a:r>
+            <a:endParaRPr lang="es-ES" sz="900" dirty="0">
+              <a:solidFill>
+                <a:schemeClr val="tx1"/>
+              </a:solidFill>
+            </a:endParaRPr>
+          </a:p>
+        </p:txBody>
+      </p:sp>
+      <p:sp>
+        <p:nvSpPr>
+          <p:cNvPr id="95" name="Rectángulo 94" descr="Nodo de segundo nivel" title="Nodo02"/>
+          <p:cNvSpPr/>
+          <p:nvPr/>
+        </p:nvSpPr>
+        <p:spPr>
+          <a:xfrm>
+            <a:off x="8065329" y="1564376"/>
+            <a:ext cx="823657" cy="339588"/>
+          </a:xfrm>
+          <a:prstGeom prst="rect">
+            <a:avLst/>
+          </a:prstGeom>
+          <a:solidFill>
+            <a:schemeClr val="bg2">
+              <a:lumMod val="50000"/>
+            </a:schemeClr>
+          </a:solidFill>
+          <a:ln>
+            <a:solidFill>
+              <a:schemeClr val="tx1"/>
+            </a:solidFill>
+          </a:ln>
+        </p:spPr>
+        <p:style>
+          <a:lnRef idx="2">
+            <a:schemeClr val="accent6"/>
+          </a:lnRef>
+          <a:fillRef idx="1">
+            <a:schemeClr val="lt1"/>
+          </a:fillRef>
+          <a:effectRef idx="0">
+            <a:schemeClr val="accent6"/>
+          </a:effectRef>
+          <a:fontRef idx="minor">
+            <a:schemeClr val="dk1"/>
+          </a:fontRef>
+        </p:style>
+        <p:txBody>
+          <a:bodyPr rtlCol="0" anchor="ctr"/>
+          <a:lstStyle/>
+          <a:p>
+            <a:pPr algn="ctr"/>
+            <a:r>
+              <a:rPr lang="es-ES" sz="900" dirty="0">
+                <a:solidFill>
+                  <a:schemeClr val="bg1"/>
+                </a:solidFill>
+              </a:rPr>
+              <a:t>l</a:t>
+            </a:r>
+            <a:r>
+              <a:rPr lang="es-ES" sz="900" dirty="0" smtClean="0">
+                <a:solidFill>
+                  <a:schemeClr val="bg1"/>
+                </a:solidFill>
+              </a:rPr>
+              <a:t>a vida cotidiana</a:t>
+            </a:r>
+            <a:endParaRPr lang="es-ES" sz="900" dirty="0">
+              <a:solidFill>
+                <a:schemeClr val="bg1"/>
+              </a:solidFill>
+            </a:endParaRPr>
+          </a:p>
+        </p:txBody>
+      </p:sp>
+      <p:sp>
+        <p:nvSpPr>
+          <p:cNvPr id="96" name="CuadroTexto 95" descr="Conector entre nodos" title="conector"/>
+          <p:cNvSpPr txBox="1"/>
+          <p:nvPr/>
+        </p:nvSpPr>
+        <p:spPr>
+          <a:xfrm>
+            <a:off x="6874973" y="2086730"/>
+            <a:ext cx="1136505" cy="230836"/>
+          </a:xfrm>
+          <a:prstGeom prst="rect">
+            <a:avLst/>
+          </a:prstGeom>
+          <a:noFill/>
+        </p:spPr>
+        <p:txBody>
+          <a:bodyPr wrap="square" rtlCol="0">
+            <a:spAutoFit/>
+          </a:bodyPr>
+          <a:lstStyle/>
+          <a:p>
+            <a:pPr algn="ctr"/>
+            <a:r>
+              <a:rPr lang="es-ES" sz="900" dirty="0" smtClean="0"/>
+              <a:t>permite identificar</a:t>
+            </a:r>
+            <a:endParaRPr lang="es-ES" sz="900" dirty="0"/>
+          </a:p>
+        </p:txBody>
+      </p:sp>
+      <p:sp>
+        <p:nvSpPr>
+          <p:cNvPr id="98" name="Rectángulo 97" descr="Nodo de tercer nivel" title="Nodo03"/>
+          <p:cNvSpPr/>
+          <p:nvPr/>
+        </p:nvSpPr>
+        <p:spPr>
+          <a:xfrm>
+            <a:off x="6968052" y="2524716"/>
+            <a:ext cx="950348" cy="662092"/>
+          </a:xfrm>
+          <a:prstGeom prst="rect">
+            <a:avLst/>
+          </a:prstGeom>
+          <a:solidFill>
+            <a:schemeClr val="bg2">
+              <a:lumMod val="90000"/>
+            </a:schemeClr>
+          </a:solidFill>
+          <a:ln>
+            <a:solidFill>
+              <a:schemeClr val="tx1"/>
+            </a:solidFill>
+          </a:ln>
+        </p:spPr>
+        <p:style>
+          <a:lnRef idx="2">
+            <a:schemeClr val="accent6"/>
+          </a:lnRef>
+          <a:fillRef idx="1">
+            <a:schemeClr val="lt1"/>
+          </a:fillRef>
+          <a:effectRef idx="0">
+            <a:schemeClr val="accent6"/>
+          </a:effectRef>
+          <a:fontRef idx="minor">
+            <a:schemeClr val="dk1"/>
+          </a:fontRef>
+        </p:style>
+        <p:txBody>
+          <a:bodyPr rtlCol="0" anchor="ctr"/>
+          <a:lstStyle/>
+          <a:p>
+            <a:pPr marL="171450" indent="-171450">
+              <a:buFont typeface="Arial" panose="020B0604020202020204" pitchFamily="34" charset="0"/>
+              <a:buChar char="•"/>
+            </a:pPr>
+            <a:r>
+              <a:rPr lang="es-ES" sz="800" dirty="0">
+                <a:solidFill>
+                  <a:schemeClr val="tx1"/>
+                </a:solidFill>
+              </a:rPr>
+              <a:t>n</a:t>
+            </a:r>
+            <a:r>
+              <a:rPr lang="es-ES" sz="800" dirty="0" smtClean="0">
+                <a:solidFill>
+                  <a:schemeClr val="tx1"/>
+                </a:solidFill>
+              </a:rPr>
+              <a:t>úmeros opuestos</a:t>
+            </a:r>
+          </a:p>
+          <a:p>
+            <a:pPr marL="171450" indent="-171450">
+              <a:buFont typeface="Arial" panose="020B0604020202020204" pitchFamily="34" charset="0"/>
+              <a:buChar char="•"/>
+            </a:pPr>
+            <a:r>
+              <a:rPr lang="es-ES" sz="800" dirty="0" smtClean="0">
+                <a:solidFill>
+                  <a:schemeClr val="tx1"/>
+                </a:solidFill>
+              </a:rPr>
+              <a:t>c</a:t>
+            </a:r>
+            <a:r>
+              <a:rPr lang="es-ES" sz="800" dirty="0" smtClean="0">
+                <a:solidFill>
+                  <a:schemeClr val="tx1"/>
+                </a:solidFill>
+              </a:rPr>
+              <a:t>oordenadas cartesianas</a:t>
+            </a:r>
+            <a:endParaRPr lang="es-ES" sz="800" dirty="0">
+              <a:solidFill>
+                <a:schemeClr val="tx1"/>
+              </a:solidFill>
+            </a:endParaRPr>
+          </a:p>
+        </p:txBody>
+      </p:sp>
+      <p:sp>
+        <p:nvSpPr>
+          <p:cNvPr id="99" name="CuadroTexto 98" descr="Conector entre nodos" title="conector"/>
+          <p:cNvSpPr txBox="1"/>
+          <p:nvPr/>
+        </p:nvSpPr>
+        <p:spPr>
+          <a:xfrm>
+            <a:off x="7972983" y="2093139"/>
+            <a:ext cx="1117174" cy="230832"/>
+          </a:xfrm>
+          <a:prstGeom prst="rect">
+            <a:avLst/>
+          </a:prstGeom>
+          <a:noFill/>
+        </p:spPr>
+        <p:txBody>
+          <a:bodyPr wrap="square" rtlCol="0">
+            <a:spAutoFit/>
+          </a:bodyPr>
+          <a:lstStyle/>
+          <a:p>
+            <a:pPr algn="ctr"/>
+            <a:r>
+              <a:rPr lang="es-ES" sz="900" dirty="0" smtClean="0"/>
+              <a:t>para representar</a:t>
+            </a:r>
+            <a:endParaRPr lang="es-ES" sz="900" dirty="0"/>
+          </a:p>
+        </p:txBody>
+      </p:sp>
+      <p:sp>
+        <p:nvSpPr>
+          <p:cNvPr id="100" name="Rectángulo 99" descr="Nodo de tercer nivel" title="Nodo03"/>
+          <p:cNvSpPr/>
+          <p:nvPr/>
+        </p:nvSpPr>
+        <p:spPr>
+          <a:xfrm>
+            <a:off x="8139502" y="2551701"/>
+            <a:ext cx="912073" cy="728143"/>
+          </a:xfrm>
+          <a:prstGeom prst="rect">
+            <a:avLst/>
+          </a:prstGeom>
+          <a:solidFill>
+            <a:schemeClr val="bg2">
+              <a:lumMod val="90000"/>
+            </a:schemeClr>
+          </a:solidFill>
+          <a:ln>
+            <a:solidFill>
+              <a:schemeClr val="tx1"/>
+            </a:solidFill>
+          </a:ln>
+        </p:spPr>
+        <p:style>
+          <a:lnRef idx="2">
+            <a:schemeClr val="accent6"/>
+          </a:lnRef>
+          <a:fillRef idx="1">
+            <a:schemeClr val="lt1"/>
+          </a:fillRef>
+          <a:effectRef idx="0">
+            <a:schemeClr val="accent6"/>
+          </a:effectRef>
+          <a:fontRef idx="minor">
+            <a:schemeClr val="dk1"/>
+          </a:fontRef>
+        </p:style>
+        <p:txBody>
+          <a:bodyPr rtlCol="0" anchor="ctr"/>
+          <a:lstStyle/>
+          <a:p>
+            <a:pPr algn="ctr"/>
+            <a:r>
+              <a:rPr lang="es-ES" sz="800" dirty="0">
+                <a:solidFill>
+                  <a:schemeClr val="tx1"/>
+                </a:solidFill>
+              </a:rPr>
+              <a:t>Situaciones de aumento, disminución, desplazamientos, variaciones, entre otras</a:t>
+            </a:r>
+            <a:endParaRPr lang="es-ES" sz="800" dirty="0">
               <a:solidFill>
                 <a:schemeClr val="tx1"/>
               </a:solidFill>
@@ -3492,38 +3413,33 @@
       </p:sp>
       <p:cxnSp>
         <p:nvCxnSpPr>
-          <p:cNvPr id="46" name="Conector angular 45"/>
+          <p:cNvPr id="17" name="Conector angular 16"/>
           <p:cNvCxnSpPr>
-            <a:endCxn id="135" idx="1"/>
+            <a:stCxn id="135" idx="1"/>
+            <a:endCxn id="140" idx="1"/>
           </p:cNvCxnSpPr>
           <p:nvPr/>
         </p:nvCxnSpPr>
         <p:spPr>
-          <a:xfrm rot="5400000">
-            <a:off x="6216272" y="1608662"/>
-            <a:ext cx="320032" cy="232210"/>
-          </a:xfrm>
-          <a:prstGeom prst="bentConnector4">
+          <a:xfrm rot="10800000" flipV="1">
+            <a:off x="5750228" y="1596932"/>
+            <a:ext cx="27304" cy="1586492"/>
+          </a:xfrm>
+          <a:prstGeom prst="bentConnector3">
             <a:avLst>
-              <a:gd name="adj1" fmla="val -602"/>
-              <a:gd name="adj2" fmla="val 167193"/>
+              <a:gd name="adj1" fmla="val 937240"/>
             </a:avLst>
           </a:prstGeom>
-          <a:ln>
-            <a:solidFill>
-              <a:schemeClr val="tx1"/>
-            </a:solidFill>
-          </a:ln>
         </p:spPr>
         <p:style>
           <a:lnRef idx="1">
-            <a:schemeClr val="accent1"/>
+            <a:schemeClr val="dk1"/>
           </a:lnRef>
           <a:fillRef idx="0">
-            <a:schemeClr val="accent1"/>
-          </a:fillRef>
-          <a:effectRef idx="0">
-            <a:schemeClr val="accent1"/>
+            <a:schemeClr val="dk1"/>
+          </a:fillRef>
+          <a:effectRef idx="0">
+            <a:schemeClr val="dk1"/>
           </a:effectRef>
           <a:fontRef idx="minor">
             <a:schemeClr val="tx1"/>
@@ -3532,35 +3448,34 @@
       </p:cxnSp>
       <p:cxnSp>
         <p:nvCxnSpPr>
-          <p:cNvPr id="57" name="Conector angular 56"/>
-          <p:cNvCxnSpPr/>
+          <p:cNvPr id="20" name="Conector angular 19"/>
+          <p:cNvCxnSpPr>
+            <a:stCxn id="220" idx="0"/>
+            <a:endCxn id="95" idx="0"/>
+          </p:cNvCxnSpPr>
           <p:nvPr/>
         </p:nvCxnSpPr>
         <p:spPr>
-          <a:xfrm rot="16200000" flipH="1">
-            <a:off x="5280648" y="2698102"/>
-            <a:ext cx="1775468" cy="143646"/>
+          <a:xfrm rot="5400000" flipH="1" flipV="1">
+            <a:off x="7924387" y="1033303"/>
+            <a:ext cx="21697" cy="1083845"/>
           </a:xfrm>
           <a:prstGeom prst="bentConnector3">
             <a:avLst>
-              <a:gd name="adj1" fmla="val 100684"/>
+              <a:gd name="adj1" fmla="val 1153602"/>
             </a:avLst>
           </a:prstGeom>
-          <a:ln>
-            <a:solidFill>
-              <a:schemeClr val="tx1"/>
-            </a:solidFill>
-          </a:ln>
+          <a:ln/>
         </p:spPr>
         <p:style>
           <a:lnRef idx="1">
-            <a:schemeClr val="accent1"/>
+            <a:schemeClr val="dk1"/>
           </a:lnRef>
           <a:fillRef idx="0">
-            <a:schemeClr val="accent1"/>
-          </a:fillRef>
-          <a:effectRef idx="0">
-            <a:schemeClr val="accent1"/>
+            <a:schemeClr val="dk1"/>
+          </a:fillRef>
+          <a:effectRef idx="0">
+            <a:schemeClr val="dk1"/>
           </a:effectRef>
           <a:fontRef idx="minor">
             <a:schemeClr val="tx1"/>
@@ -3569,20 +3484,20 @@
       </p:cxnSp>
       <p:cxnSp>
         <p:nvCxnSpPr>
-          <p:cNvPr id="63" name="Conector angular 62"/>
-          <p:cNvCxnSpPr/>
+          <p:cNvPr id="24" name="Conector angular 23"/>
+          <p:cNvCxnSpPr>
+            <a:stCxn id="216" idx="2"/>
+            <a:endCxn id="291" idx="0"/>
+          </p:cNvCxnSpPr>
           <p:nvPr/>
         </p:nvCxnSpPr>
         <p:spPr>
           <a:xfrm rot="5400000">
-            <a:off x="838113" y="1335057"/>
-            <a:ext cx="393421" cy="576311"/>
-          </a:xfrm>
-          <a:prstGeom prst="bentConnector4">
-            <a:avLst>
-              <a:gd name="adj1" fmla="val 35332"/>
-              <a:gd name="adj2" fmla="val 139666"/>
-            </a:avLst>
+            <a:off x="4636809" y="1080354"/>
+            <a:ext cx="98624" cy="5975"/>
+          </a:xfrm>
+          <a:prstGeom prst="bentConnector3">
+            <a:avLst/>
           </a:prstGeom>
           <a:ln>
             <a:solidFill>
@@ -3607,277 +3522,19 @@
       </p:cxnSp>
       <p:cxnSp>
         <p:nvCxnSpPr>
-          <p:cNvPr id="66" name="Conector angular 65"/>
-          <p:cNvCxnSpPr/>
+          <p:cNvPr id="111" name="Conector recto 110"/>
+          <p:cNvCxnSpPr>
+            <a:endCxn id="216" idx="0"/>
+          </p:cNvCxnSpPr>
           <p:nvPr/>
         </p:nvCxnSpPr>
         <p:spPr>
-          <a:xfrm rot="10800000" flipH="1" flipV="1">
-            <a:off x="745585" y="1826783"/>
-            <a:ext cx="45978" cy="744906"/>
-          </a:xfrm>
-          <a:prstGeom prst="bentConnector4">
-            <a:avLst>
-              <a:gd name="adj1" fmla="val -497194"/>
-              <a:gd name="adj2" fmla="val 97496"/>
-            </a:avLst>
-          </a:prstGeom>
-          <a:ln>
-            <a:solidFill>
-              <a:schemeClr val="tx1"/>
-            </a:solidFill>
-          </a:ln>
-        </p:spPr>
-        <p:style>
-          <a:lnRef idx="1">
-            <a:schemeClr val="accent1"/>
-          </a:lnRef>
-          <a:fillRef idx="0">
-            <a:schemeClr val="accent1"/>
-          </a:fillRef>
-          <a:effectRef idx="0">
-            <a:schemeClr val="accent1"/>
-          </a:effectRef>
-          <a:fontRef idx="minor">
-            <a:schemeClr val="tx1"/>
-          </a:fontRef>
-        </p:style>
-      </p:cxnSp>
-      <p:sp>
-        <p:nvSpPr>
-          <p:cNvPr id="170" name="Rectángulo 169" descr="Nodo de primer nivel" title="Nodo01"/>
-          <p:cNvSpPr/>
-          <p:nvPr/>
-        </p:nvSpPr>
-        <p:spPr>
           <a:xfrm>
-            <a:off x="7736896" y="3016588"/>
-            <a:ext cx="1124746" cy="597391"/>
-          </a:xfrm>
-          <a:prstGeom prst="rect">
-            <a:avLst/>
-          </a:prstGeom>
-          <a:solidFill>
-            <a:schemeClr val="bg1"/>
-          </a:solidFill>
-          <a:ln>
-            <a:solidFill>
-              <a:schemeClr val="tx1"/>
-            </a:solidFill>
-          </a:ln>
-          <a:effectLst>
-            <a:outerShdw blurRad="50800" dist="38100" dir="2700000" algn="tl" rotWithShape="0">
-              <a:prstClr val="black">
-                <a:alpha val="40000"/>
-              </a:prstClr>
-            </a:outerShdw>
-          </a:effectLst>
-        </p:spPr>
-        <p:style>
-          <a:lnRef idx="2">
-            <a:schemeClr val="accent6"/>
-          </a:lnRef>
-          <a:fillRef idx="1">
-            <a:schemeClr val="lt1"/>
-          </a:fillRef>
-          <a:effectRef idx="0">
-            <a:schemeClr val="accent6"/>
-          </a:effectRef>
-          <a:fontRef idx="minor">
-            <a:schemeClr val="dk1"/>
-          </a:fontRef>
-        </p:style>
-        <p:txBody>
-          <a:bodyPr rtlCol="0" anchor="ctr"/>
-          <a:lstStyle/>
-          <a:p>
-            <a:pPr algn="ctr"/>
-            <a:r>
-              <a:rPr lang="es-ES" sz="1200" b="1" dirty="0" smtClean="0"/>
-              <a:t>la </a:t>
-            </a:r>
-            <a:r>
-              <a:rPr lang="es-ES" sz="1200" b="1" dirty="0" smtClean="0"/>
-              <a:t>vida cotidiana</a:t>
-            </a:r>
-            <a:endParaRPr lang="es-ES" sz="1200" b="1" dirty="0"/>
-          </a:p>
-        </p:txBody>
-      </p:sp>
-      <p:sp>
-        <p:nvSpPr>
-          <p:cNvPr id="171" name="Rectángulo 170" descr="Nodo de segundo nivel" title="Nodo02"/>
-          <p:cNvSpPr/>
-          <p:nvPr/>
-        </p:nvSpPr>
-        <p:spPr>
-          <a:xfrm>
-            <a:off x="7736896" y="2339306"/>
-            <a:ext cx="1124746" cy="266308"/>
-          </a:xfrm>
-          <a:prstGeom prst="rect">
-            <a:avLst/>
-          </a:prstGeom>
-          <a:solidFill>
-            <a:schemeClr val="bg2">
-              <a:lumMod val="50000"/>
-            </a:schemeClr>
-          </a:solidFill>
-          <a:ln>
-            <a:solidFill>
-              <a:schemeClr val="tx1"/>
-            </a:solidFill>
-          </a:ln>
-        </p:spPr>
-        <p:style>
-          <a:lnRef idx="2">
-            <a:schemeClr val="accent6"/>
-          </a:lnRef>
-          <a:fillRef idx="1">
-            <a:schemeClr val="lt1"/>
-          </a:fillRef>
-          <a:effectRef idx="0">
-            <a:schemeClr val="accent6"/>
-          </a:effectRef>
-          <a:fontRef idx="minor">
-            <a:schemeClr val="dk1"/>
-          </a:fontRef>
-        </p:style>
-        <p:txBody>
-          <a:bodyPr rtlCol="0" anchor="ctr"/>
-          <a:lstStyle/>
-          <a:p>
-            <a:pPr algn="ctr"/>
-            <a:r>
-              <a:rPr lang="es-ES" sz="1050" dirty="0" smtClean="0">
-                <a:solidFill>
-                  <a:schemeClr val="bg1"/>
-                </a:solidFill>
-              </a:rPr>
-              <a:t>plano </a:t>
-            </a:r>
-            <a:r>
-              <a:rPr lang="es-ES" sz="1050" dirty="0" smtClean="0">
-                <a:solidFill>
-                  <a:schemeClr val="bg1"/>
-                </a:solidFill>
-              </a:rPr>
-              <a:t>cartesiano</a:t>
-            </a:r>
-            <a:endParaRPr lang="es-ES" sz="1050" dirty="0">
-              <a:solidFill>
-                <a:schemeClr val="bg1"/>
-              </a:solidFill>
-            </a:endParaRPr>
-          </a:p>
-        </p:txBody>
-      </p:sp>
-      <p:sp>
-        <p:nvSpPr>
-          <p:cNvPr id="174" name="Rectángulo 173" descr="Nodo de segundo nivel" title="Nodo02"/>
-          <p:cNvSpPr/>
-          <p:nvPr/>
-        </p:nvSpPr>
-        <p:spPr>
-          <a:xfrm>
-            <a:off x="7736896" y="4122469"/>
-            <a:ext cx="1136889" cy="1166396"/>
-          </a:xfrm>
-          <a:prstGeom prst="rect">
-            <a:avLst/>
-          </a:prstGeom>
-          <a:solidFill>
-            <a:schemeClr val="bg2">
-              <a:lumMod val="50000"/>
-            </a:schemeClr>
-          </a:solidFill>
-          <a:ln>
-            <a:solidFill>
-              <a:schemeClr val="tx1"/>
-            </a:solidFill>
-          </a:ln>
-        </p:spPr>
-        <p:style>
-          <a:lnRef idx="2">
-            <a:schemeClr val="accent6"/>
-          </a:lnRef>
-          <a:fillRef idx="1">
-            <a:schemeClr val="lt1"/>
-          </a:fillRef>
-          <a:effectRef idx="0">
-            <a:schemeClr val="accent6"/>
-          </a:effectRef>
-          <a:fontRef idx="minor">
-            <a:schemeClr val="dk1"/>
-          </a:fontRef>
-        </p:style>
-        <p:txBody>
-          <a:bodyPr rtlCol="0" anchor="ctr"/>
-          <a:lstStyle/>
-          <a:p>
-            <a:pPr algn="ctr"/>
-            <a:r>
-              <a:rPr lang="es-ES" sz="1050" dirty="0" smtClean="0">
-                <a:solidFill>
-                  <a:schemeClr val="bg1"/>
-                </a:solidFill>
-              </a:rPr>
-              <a:t>Situaciones de aumento, disminución, desplazamientos, variaciones, entre otras</a:t>
-            </a:r>
-            <a:endParaRPr lang="es-ES" sz="1050" dirty="0">
-              <a:solidFill>
-                <a:schemeClr val="bg1"/>
-              </a:solidFill>
-            </a:endParaRPr>
-          </a:p>
-        </p:txBody>
-      </p:sp>
-      <p:sp>
-        <p:nvSpPr>
-          <p:cNvPr id="178" name="CuadroTexto 177" descr="Conector entre nodos" title="conector"/>
-          <p:cNvSpPr txBox="1"/>
-          <p:nvPr/>
-        </p:nvSpPr>
-        <p:spPr>
-          <a:xfrm>
-            <a:off x="7813917" y="1421359"/>
-            <a:ext cx="1117174" cy="230836"/>
-          </a:xfrm>
-          <a:prstGeom prst="rect">
-            <a:avLst/>
-          </a:prstGeom>
-          <a:noFill/>
-        </p:spPr>
-        <p:txBody>
-          <a:bodyPr wrap="square" rtlCol="0">
-            <a:spAutoFit/>
-          </a:bodyPr>
-          <a:lstStyle/>
-          <a:p>
-            <a:pPr algn="ctr"/>
-            <a:r>
-              <a:rPr lang="es-ES" sz="900" dirty="0" smtClean="0"/>
-              <a:t>en</a:t>
-            </a:r>
-            <a:endParaRPr lang="es-ES" sz="900" dirty="0"/>
-          </a:p>
-        </p:txBody>
-      </p:sp>
-      <p:cxnSp>
-        <p:nvCxnSpPr>
-          <p:cNvPr id="82" name="Conector angular 81"/>
-          <p:cNvCxnSpPr/>
-          <p:nvPr/>
-        </p:nvCxnSpPr>
-        <p:spPr>
-          <a:xfrm rot="10800000" flipV="1">
-            <a:off x="7813917" y="1568821"/>
-            <a:ext cx="513706" cy="311070"/>
-          </a:xfrm>
-          <a:prstGeom prst="bentConnector3">
-            <a:avLst>
-              <a:gd name="adj1" fmla="val 124722"/>
-            </a:avLst>
+            <a:off x="4688568" y="494229"/>
+            <a:ext cx="540" cy="100018"/>
+          </a:xfrm>
+          <a:prstGeom prst="line">
+            <a:avLst/>
           </a:prstGeom>
           <a:ln>
             <a:solidFill>
@@ -3902,18 +3559,16 @@
       </p:cxnSp>
       <p:cxnSp>
         <p:nvCxnSpPr>
-          <p:cNvPr id="92" name="Conector angular 91"/>
-          <p:cNvCxnSpPr>
-            <a:stCxn id="171" idx="1"/>
-          </p:cNvCxnSpPr>
+          <p:cNvPr id="113" name="Conector recto 112"/>
+          <p:cNvCxnSpPr/>
           <p:nvPr/>
         </p:nvCxnSpPr>
         <p:spPr>
-          <a:xfrm rot="10800000">
-            <a:off x="7680804" y="1875842"/>
-            <a:ext cx="56092" cy="596619"/>
-          </a:xfrm>
-          <a:prstGeom prst="bentConnector2">
+          <a:xfrm>
+            <a:off x="6275120" y="496738"/>
+            <a:ext cx="540" cy="100018"/>
+          </a:xfrm>
+          <a:prstGeom prst="line">
             <a:avLst/>
           </a:prstGeom>
           <a:ln>
@@ -3939,81 +3594,25 @@
       </p:cxnSp>
       <p:cxnSp>
         <p:nvCxnSpPr>
-          <p:cNvPr id="207" name="Conector recto 206"/>
-          <p:cNvCxnSpPr>
-            <a:stCxn id="171" idx="2"/>
-          </p:cNvCxnSpPr>
+          <p:cNvPr id="119" name="Conector angular 118"/>
+          <p:cNvCxnSpPr/>
           <p:nvPr/>
         </p:nvCxnSpPr>
         <p:spPr>
-          <a:xfrm>
-            <a:off x="8299269" y="2605614"/>
-            <a:ext cx="5262" cy="379835"/>
-          </a:xfrm>
-          <a:prstGeom prst="line">
-            <a:avLst/>
-          </a:prstGeom>
-        </p:spPr>
-        <p:style>
-          <a:lnRef idx="1">
-            <a:schemeClr val="accent1"/>
-          </a:lnRef>
-          <a:fillRef idx="0">
-            <a:schemeClr val="accent1"/>
-          </a:fillRef>
-          <a:effectRef idx="0">
-            <a:schemeClr val="accent1"/>
-          </a:effectRef>
-          <a:fontRef idx="minor">
-            <a:schemeClr val="tx1"/>
-          </a:fontRef>
-        </p:style>
-      </p:cxnSp>
-      <p:sp>
-        <p:nvSpPr>
-          <p:cNvPr id="210" name="CuadroTexto 209" descr="Conector entre nodos" title="conector"/>
-          <p:cNvSpPr txBox="1"/>
-          <p:nvPr/>
-        </p:nvSpPr>
-        <p:spPr>
-          <a:xfrm>
-            <a:off x="7744468" y="3802913"/>
-            <a:ext cx="1117174" cy="230836"/>
-          </a:xfrm>
-          <a:prstGeom prst="rect">
-            <a:avLst/>
-          </a:prstGeom>
-          <a:noFill/>
-        </p:spPr>
-        <p:txBody>
-          <a:bodyPr wrap="square" rtlCol="0">
-            <a:spAutoFit/>
-          </a:bodyPr>
-          <a:lstStyle/>
-          <a:p>
-            <a:pPr algn="ctr"/>
-            <a:r>
-              <a:rPr lang="es-ES" sz="900" dirty="0" smtClean="0"/>
-              <a:t>en</a:t>
-            </a:r>
-            <a:endParaRPr lang="es-ES" sz="900" dirty="0"/>
-          </a:p>
-        </p:txBody>
-      </p:sp>
-      <p:cxnSp>
-        <p:nvCxnSpPr>
-          <p:cNvPr id="213" name="Conector recto 212"/>
-          <p:cNvCxnSpPr/>
-          <p:nvPr/>
-        </p:nvCxnSpPr>
-        <p:spPr>
-          <a:xfrm>
-            <a:off x="8299269" y="3652587"/>
-            <a:ext cx="0" cy="130629"/>
-          </a:xfrm>
-          <a:prstGeom prst="line">
-            <a:avLst/>
-          </a:prstGeom>
+          <a:xfrm rot="5400000">
+            <a:off x="1069433" y="1084885"/>
+            <a:ext cx="129822" cy="82075"/>
+          </a:xfrm>
+          <a:prstGeom prst="bentConnector3">
+            <a:avLst>
+              <a:gd name="adj1" fmla="val 3559"/>
+            </a:avLst>
+          </a:prstGeom>
+          <a:ln w="12700">
+            <a:solidFill>
+              <a:schemeClr val="tx1"/>
+            </a:solidFill>
+          </a:ln>
         </p:spPr>
         <p:style>
           <a:lnRef idx="1">
@@ -4032,18 +3631,25 @@
       </p:cxnSp>
       <p:cxnSp>
         <p:nvCxnSpPr>
-          <p:cNvPr id="227" name="Conector recto 226"/>
+          <p:cNvPr id="123" name="Conector angular 122"/>
           <p:cNvCxnSpPr/>
           <p:nvPr/>
         </p:nvCxnSpPr>
         <p:spPr>
-          <a:xfrm>
-            <a:off x="8391992" y="1369395"/>
-            <a:ext cx="0" cy="130629"/>
-          </a:xfrm>
-          <a:prstGeom prst="line">
-            <a:avLst/>
-          </a:prstGeom>
+          <a:xfrm rot="5400000">
+            <a:off x="2736883" y="1894054"/>
+            <a:ext cx="162688" cy="41036"/>
+          </a:xfrm>
+          <a:prstGeom prst="bentConnector3">
+            <a:avLst>
+              <a:gd name="adj1" fmla="val 12250"/>
+            </a:avLst>
+          </a:prstGeom>
+          <a:ln w="12700">
+            <a:solidFill>
+              <a:schemeClr val="tx1"/>
+            </a:solidFill>
+          </a:ln>
         </p:spPr>
         <p:style>
           <a:lnRef idx="1">
@@ -4062,18 +3668,27 @@
       </p:cxnSp>
       <p:cxnSp>
         <p:nvCxnSpPr>
-          <p:cNvPr id="228" name="Conector recto 227"/>
-          <p:cNvCxnSpPr/>
+          <p:cNvPr id="124" name="Conector angular 123"/>
+          <p:cNvCxnSpPr>
+            <a:endCxn id="93" idx="0"/>
+          </p:cNvCxnSpPr>
           <p:nvPr/>
         </p:nvCxnSpPr>
         <p:spPr>
-          <a:xfrm>
-            <a:off x="6793485" y="1357784"/>
-            <a:ext cx="0" cy="130629"/>
-          </a:xfrm>
-          <a:prstGeom prst="line">
-            <a:avLst/>
-          </a:prstGeom>
+          <a:xfrm rot="16200000" flipH="1">
+            <a:off x="4628228" y="2278322"/>
+            <a:ext cx="187195" cy="18711"/>
+          </a:xfrm>
+          <a:prstGeom prst="bentConnector3">
+            <a:avLst>
+              <a:gd name="adj1" fmla="val 2611"/>
+            </a:avLst>
+          </a:prstGeom>
+          <a:ln w="12700">
+            <a:solidFill>
+              <a:schemeClr val="tx1"/>
+            </a:solidFill>
+          </a:ln>
         </p:spPr>
         <p:style>
           <a:lnRef idx="1">
@@ -4092,19 +3707,21 @@
       </p:cxnSp>
       <p:cxnSp>
         <p:nvCxnSpPr>
-          <p:cNvPr id="229" name="Conector recto 228"/>
+          <p:cNvPr id="127" name="Conector angular 126"/>
           <p:cNvCxnSpPr/>
           <p:nvPr/>
         </p:nvCxnSpPr>
         <p:spPr>
-          <a:xfrm>
-            <a:off x="5225974" y="1386093"/>
-            <a:ext cx="0" cy="130629"/>
-          </a:xfrm>
-          <a:prstGeom prst="line">
-            <a:avLst/>
-          </a:prstGeom>
-          <a:ln>
+          <a:xfrm rot="16200000" flipH="1">
+            <a:off x="4632991" y="2692863"/>
+            <a:ext cx="187195" cy="18711"/>
+          </a:xfrm>
+          <a:prstGeom prst="bentConnector3">
+            <a:avLst>
+              <a:gd name="adj1" fmla="val 2611"/>
+            </a:avLst>
+          </a:prstGeom>
+          <a:ln w="12700">
             <a:solidFill>
               <a:schemeClr val="tx1"/>
             </a:solidFill>
@@ -4127,19 +3744,21 @@
       </p:cxnSp>
       <p:cxnSp>
         <p:nvCxnSpPr>
-          <p:cNvPr id="230" name="Conector recto 229"/>
+          <p:cNvPr id="128" name="Conector angular 127"/>
           <p:cNvCxnSpPr/>
           <p:nvPr/>
         </p:nvCxnSpPr>
         <p:spPr>
-          <a:xfrm>
-            <a:off x="3240348" y="1434122"/>
-            <a:ext cx="0" cy="130629"/>
-          </a:xfrm>
-          <a:prstGeom prst="line">
-            <a:avLst/>
-          </a:prstGeom>
-          <a:ln>
+          <a:xfrm rot="16200000" flipH="1">
+            <a:off x="2701850" y="2784493"/>
+            <a:ext cx="187195" cy="18711"/>
+          </a:xfrm>
+          <a:prstGeom prst="bentConnector3">
+            <a:avLst>
+              <a:gd name="adj1" fmla="val 2611"/>
+            </a:avLst>
+          </a:prstGeom>
+          <a:ln w="12700">
             <a:solidFill>
               <a:schemeClr val="tx1"/>
             </a:solidFill>
@@ -4162,19 +3781,21 @@
       </p:cxnSp>
       <p:cxnSp>
         <p:nvCxnSpPr>
-          <p:cNvPr id="231" name="Conector recto 230"/>
+          <p:cNvPr id="129" name="Conector angular 128"/>
           <p:cNvCxnSpPr/>
           <p:nvPr/>
         </p:nvCxnSpPr>
         <p:spPr>
-          <a:xfrm>
-            <a:off x="3240348" y="1619643"/>
-            <a:ext cx="0" cy="130629"/>
-          </a:xfrm>
-          <a:prstGeom prst="line">
-            <a:avLst/>
-          </a:prstGeom>
-          <a:ln>
+          <a:xfrm rot="16200000" flipH="1">
+            <a:off x="2668942" y="3132995"/>
+            <a:ext cx="187195" cy="18711"/>
+          </a:xfrm>
+          <a:prstGeom prst="bentConnector3">
+            <a:avLst>
+              <a:gd name="adj1" fmla="val 2611"/>
+            </a:avLst>
+          </a:prstGeom>
+          <a:ln w="12700">
             <a:solidFill>
               <a:schemeClr val="tx1"/>
             </a:solidFill>
@@ -4197,19 +3818,21 @@
       </p:cxnSp>
       <p:cxnSp>
         <p:nvCxnSpPr>
-          <p:cNvPr id="232" name="Conector recto 231"/>
+          <p:cNvPr id="145" name="Conector angular 144"/>
           <p:cNvCxnSpPr/>
           <p:nvPr/>
         </p:nvCxnSpPr>
         <p:spPr>
-          <a:xfrm>
-            <a:off x="5225974" y="1575417"/>
-            <a:ext cx="0" cy="251366"/>
-          </a:xfrm>
-          <a:prstGeom prst="line">
-            <a:avLst/>
-          </a:prstGeom>
-          <a:ln>
+          <a:xfrm rot="16200000" flipH="1">
+            <a:off x="2711205" y="2266833"/>
+            <a:ext cx="187195" cy="18711"/>
+          </a:xfrm>
+          <a:prstGeom prst="bentConnector3">
+            <a:avLst>
+              <a:gd name="adj1" fmla="val 2611"/>
+            </a:avLst>
+          </a:prstGeom>
+          <a:ln w="12700">
             <a:solidFill>
               <a:schemeClr val="tx1"/>
             </a:solidFill>
@@ -4232,19 +3855,21 @@
       </p:cxnSp>
       <p:cxnSp>
         <p:nvCxnSpPr>
-          <p:cNvPr id="118" name="Conector angular 117"/>
+          <p:cNvPr id="146" name="Conector angular 145"/>
           <p:cNvCxnSpPr/>
           <p:nvPr/>
         </p:nvCxnSpPr>
         <p:spPr>
           <a:xfrm rot="16200000" flipH="1">
-            <a:off x="6390148" y="-1298185"/>
-            <a:ext cx="204490" cy="3576026"/>
+            <a:off x="6014700" y="1792548"/>
+            <a:ext cx="187195" cy="18711"/>
           </a:xfrm>
           <a:prstGeom prst="bentConnector3">
-            <a:avLst/>
-          </a:prstGeom>
-          <a:ln>
+            <a:avLst>
+              <a:gd name="adj1" fmla="val 2611"/>
+            </a:avLst>
+          </a:prstGeom>
+          <a:ln w="12700">
             <a:solidFill>
               <a:schemeClr val="tx1"/>
             </a:solidFill>
@@ -4267,19 +3892,21 @@
       </p:cxnSp>
       <p:cxnSp>
         <p:nvCxnSpPr>
-          <p:cNvPr id="234" name="Conector recto 233"/>
+          <p:cNvPr id="147" name="Conector angular 146"/>
           <p:cNvCxnSpPr/>
           <p:nvPr/>
         </p:nvCxnSpPr>
         <p:spPr>
-          <a:xfrm>
-            <a:off x="6803025" y="524744"/>
-            <a:ext cx="0" cy="130629"/>
-          </a:xfrm>
-          <a:prstGeom prst="line">
-            <a:avLst/>
-          </a:prstGeom>
-          <a:ln>
+          <a:xfrm rot="16200000" flipH="1">
+            <a:off x="6025485" y="2106336"/>
+            <a:ext cx="187195" cy="18711"/>
+          </a:xfrm>
+          <a:prstGeom prst="bentConnector3">
+            <a:avLst>
+              <a:gd name="adj1" fmla="val 2611"/>
+            </a:avLst>
+          </a:prstGeom>
+          <a:ln w="12700">
             <a:solidFill>
               <a:schemeClr val="tx1"/>
             </a:solidFill>
@@ -4302,19 +3929,21 @@
       </p:cxnSp>
       <p:cxnSp>
         <p:nvCxnSpPr>
-          <p:cNvPr id="235" name="Conector recto 234"/>
+          <p:cNvPr id="148" name="Conector angular 147"/>
           <p:cNvCxnSpPr/>
           <p:nvPr/>
         </p:nvCxnSpPr>
         <p:spPr>
-          <a:xfrm>
-            <a:off x="5184209" y="524743"/>
-            <a:ext cx="0" cy="130629"/>
-          </a:xfrm>
-          <a:prstGeom prst="line">
-            <a:avLst/>
-          </a:prstGeom>
-          <a:ln>
+          <a:xfrm rot="16200000" flipH="1">
+            <a:off x="6025436" y="2975395"/>
+            <a:ext cx="187195" cy="18711"/>
+          </a:xfrm>
+          <a:prstGeom prst="bentConnector3">
+            <a:avLst>
+              <a:gd name="adj1" fmla="val 2611"/>
+            </a:avLst>
+          </a:prstGeom>
+          <a:ln w="12700">
             <a:solidFill>
               <a:schemeClr val="tx1"/>
             </a:solidFill>
@@ -4337,19 +3966,21 @@
       </p:cxnSp>
       <p:cxnSp>
         <p:nvCxnSpPr>
-          <p:cNvPr id="236" name="Conector recto 235"/>
+          <p:cNvPr id="149" name="Conector angular 148"/>
           <p:cNvCxnSpPr/>
           <p:nvPr/>
         </p:nvCxnSpPr>
         <p:spPr>
-          <a:xfrm>
-            <a:off x="3265778" y="524742"/>
-            <a:ext cx="0" cy="130629"/>
-          </a:xfrm>
-          <a:prstGeom prst="line">
-            <a:avLst/>
-          </a:prstGeom>
-          <a:ln>
+          <a:xfrm rot="16200000" flipH="1">
+            <a:off x="7290360" y="2034890"/>
+            <a:ext cx="187195" cy="18711"/>
+          </a:xfrm>
+          <a:prstGeom prst="bentConnector3">
+            <a:avLst>
+              <a:gd name="adj1" fmla="val 2611"/>
+            </a:avLst>
+          </a:prstGeom>
+          <a:ln w="12700">
             <a:solidFill>
               <a:schemeClr val="tx1"/>
             </a:solidFill>
@@ -4372,21 +4003,277 @@
       </p:cxnSp>
       <p:cxnSp>
         <p:nvCxnSpPr>
-          <p:cNvPr id="107" name="Conector angular 106"/>
-          <p:cNvCxnSpPr>
-            <a:stCxn id="174" idx="0"/>
-            <a:endCxn id="210" idx="2"/>
-          </p:cNvCxnSpPr>
+          <p:cNvPr id="150" name="Conector angular 149"/>
+          <p:cNvCxnSpPr/>
           <p:nvPr/>
         </p:nvCxnSpPr>
         <p:spPr>
-          <a:xfrm rot="16200000" flipV="1">
-            <a:off x="8259838" y="4076966"/>
-            <a:ext cx="88720" cy="2286"/>
+          <a:xfrm rot="16200000" flipH="1">
+            <a:off x="7321544" y="2397383"/>
+            <a:ext cx="187195" cy="18711"/>
           </a:xfrm>
           <a:prstGeom prst="bentConnector3">
             <a:avLst>
-              <a:gd name="adj1" fmla="val 50000"/>
+              <a:gd name="adj1" fmla="val 2611"/>
+            </a:avLst>
+          </a:prstGeom>
+          <a:ln w="12700">
+            <a:solidFill>
+              <a:schemeClr val="tx1"/>
+            </a:solidFill>
+          </a:ln>
+        </p:spPr>
+        <p:style>
+          <a:lnRef idx="1">
+            <a:schemeClr val="accent1"/>
+          </a:lnRef>
+          <a:fillRef idx="0">
+            <a:schemeClr val="accent1"/>
+          </a:fillRef>
+          <a:effectRef idx="0">
+            <a:schemeClr val="accent1"/>
+          </a:effectRef>
+          <a:fontRef idx="minor">
+            <a:schemeClr val="tx1"/>
+          </a:fontRef>
+        </p:style>
+      </p:cxnSp>
+      <p:cxnSp>
+        <p:nvCxnSpPr>
+          <p:cNvPr id="151" name="Conector angular 150"/>
+          <p:cNvCxnSpPr/>
+          <p:nvPr/>
+        </p:nvCxnSpPr>
+        <p:spPr>
+          <a:xfrm rot="16200000" flipH="1">
+            <a:off x="8372191" y="2017376"/>
+            <a:ext cx="187195" cy="18711"/>
+          </a:xfrm>
+          <a:prstGeom prst="bentConnector3">
+            <a:avLst>
+              <a:gd name="adj1" fmla="val 2611"/>
+            </a:avLst>
+          </a:prstGeom>
+          <a:ln w="12700">
+            <a:solidFill>
+              <a:schemeClr val="tx1"/>
+            </a:solidFill>
+          </a:ln>
+        </p:spPr>
+        <p:style>
+          <a:lnRef idx="1">
+            <a:schemeClr val="accent1"/>
+          </a:lnRef>
+          <a:fillRef idx="0">
+            <a:schemeClr val="accent1"/>
+          </a:fillRef>
+          <a:effectRef idx="0">
+            <a:schemeClr val="accent1"/>
+          </a:effectRef>
+          <a:fontRef idx="minor">
+            <a:schemeClr val="tx1"/>
+          </a:fontRef>
+        </p:style>
+      </p:cxnSp>
+      <p:cxnSp>
+        <p:nvCxnSpPr>
+          <p:cNvPr id="152" name="Conector angular 151"/>
+          <p:cNvCxnSpPr/>
+          <p:nvPr/>
+        </p:nvCxnSpPr>
+        <p:spPr>
+          <a:xfrm rot="16200000" flipH="1">
+            <a:off x="8394812" y="2412436"/>
+            <a:ext cx="187195" cy="18711"/>
+          </a:xfrm>
+          <a:prstGeom prst="bentConnector3">
+            <a:avLst>
+              <a:gd name="adj1" fmla="val 2611"/>
+            </a:avLst>
+          </a:prstGeom>
+          <a:ln w="12700">
+            <a:solidFill>
+              <a:schemeClr val="tx1"/>
+            </a:solidFill>
+          </a:ln>
+        </p:spPr>
+        <p:style>
+          <a:lnRef idx="1">
+            <a:schemeClr val="accent1"/>
+          </a:lnRef>
+          <a:fillRef idx="0">
+            <a:schemeClr val="accent1"/>
+          </a:fillRef>
+          <a:effectRef idx="0">
+            <a:schemeClr val="accent1"/>
+          </a:effectRef>
+          <a:fontRef idx="minor">
+            <a:schemeClr val="tx1"/>
+          </a:fontRef>
+        </p:style>
+      </p:cxnSp>
+      <p:cxnSp>
+        <p:nvCxnSpPr>
+          <p:cNvPr id="153" name="Conector angular 152"/>
+          <p:cNvCxnSpPr/>
+          <p:nvPr/>
+        </p:nvCxnSpPr>
+        <p:spPr>
+          <a:xfrm rot="16200000" flipH="1">
+            <a:off x="2732316" y="1109401"/>
+            <a:ext cx="187195" cy="18711"/>
+          </a:xfrm>
+          <a:prstGeom prst="bentConnector3">
+            <a:avLst>
+              <a:gd name="adj1" fmla="val 2611"/>
+            </a:avLst>
+          </a:prstGeom>
+          <a:ln w="12700">
+            <a:solidFill>
+              <a:schemeClr val="tx1"/>
+            </a:solidFill>
+          </a:ln>
+        </p:spPr>
+        <p:style>
+          <a:lnRef idx="1">
+            <a:schemeClr val="accent1"/>
+          </a:lnRef>
+          <a:fillRef idx="0">
+            <a:schemeClr val="accent1"/>
+          </a:fillRef>
+          <a:effectRef idx="0">
+            <a:schemeClr val="accent1"/>
+          </a:effectRef>
+          <a:fontRef idx="minor">
+            <a:schemeClr val="tx1"/>
+          </a:fontRef>
+        </p:style>
+      </p:cxnSp>
+      <p:cxnSp>
+        <p:nvCxnSpPr>
+          <p:cNvPr id="154" name="Conector angular 153"/>
+          <p:cNvCxnSpPr/>
+          <p:nvPr/>
+        </p:nvCxnSpPr>
+        <p:spPr>
+          <a:xfrm rot="16200000" flipH="1">
+            <a:off x="2720517" y="1377255"/>
+            <a:ext cx="187195" cy="18711"/>
+          </a:xfrm>
+          <a:prstGeom prst="bentConnector3">
+            <a:avLst>
+              <a:gd name="adj1" fmla="val 2611"/>
+            </a:avLst>
+          </a:prstGeom>
+          <a:ln w="12700">
+            <a:solidFill>
+              <a:schemeClr val="tx1"/>
+            </a:solidFill>
+          </a:ln>
+        </p:spPr>
+        <p:style>
+          <a:lnRef idx="1">
+            <a:schemeClr val="accent1"/>
+          </a:lnRef>
+          <a:fillRef idx="0">
+            <a:schemeClr val="accent1"/>
+          </a:fillRef>
+          <a:effectRef idx="0">
+            <a:schemeClr val="accent1"/>
+          </a:effectRef>
+          <a:fontRef idx="minor">
+            <a:schemeClr val="tx1"/>
+          </a:fontRef>
+        </p:style>
+      </p:cxnSp>
+      <p:cxnSp>
+        <p:nvCxnSpPr>
+          <p:cNvPr id="155" name="Conector angular 154"/>
+          <p:cNvCxnSpPr/>
+          <p:nvPr/>
+        </p:nvCxnSpPr>
+        <p:spPr>
+          <a:xfrm rot="16200000" flipH="1">
+            <a:off x="4583539" y="1424959"/>
+            <a:ext cx="187195" cy="18711"/>
+          </a:xfrm>
+          <a:prstGeom prst="bentConnector3">
+            <a:avLst>
+              <a:gd name="adj1" fmla="val 2611"/>
+            </a:avLst>
+          </a:prstGeom>
+          <a:ln w="12700">
+            <a:solidFill>
+              <a:schemeClr val="tx1"/>
+            </a:solidFill>
+          </a:ln>
+        </p:spPr>
+        <p:style>
+          <a:lnRef idx="1">
+            <a:schemeClr val="accent1"/>
+          </a:lnRef>
+          <a:fillRef idx="0">
+            <a:schemeClr val="accent1"/>
+          </a:fillRef>
+          <a:effectRef idx="0">
+            <a:schemeClr val="accent1"/>
+          </a:effectRef>
+          <a:fontRef idx="minor">
+            <a:schemeClr val="tx1"/>
+          </a:fontRef>
+        </p:style>
+      </p:cxnSp>
+      <p:cxnSp>
+        <p:nvCxnSpPr>
+          <p:cNvPr id="156" name="Conector angular 155"/>
+          <p:cNvCxnSpPr/>
+          <p:nvPr/>
+        </p:nvCxnSpPr>
+        <p:spPr>
+          <a:xfrm rot="16200000" flipH="1">
+            <a:off x="6119538" y="1136685"/>
+            <a:ext cx="187195" cy="18711"/>
+          </a:xfrm>
+          <a:prstGeom prst="bentConnector3">
+            <a:avLst>
+              <a:gd name="adj1" fmla="val 2611"/>
+            </a:avLst>
+          </a:prstGeom>
+          <a:ln w="12700">
+            <a:solidFill>
+              <a:schemeClr val="tx1"/>
+            </a:solidFill>
+          </a:ln>
+        </p:spPr>
+        <p:style>
+          <a:lnRef idx="1">
+            <a:schemeClr val="accent1"/>
+          </a:lnRef>
+          <a:fillRef idx="0">
+            <a:schemeClr val="accent1"/>
+          </a:fillRef>
+          <a:effectRef idx="0">
+            <a:schemeClr val="accent1"/>
+          </a:effectRef>
+          <a:fontRef idx="minor">
+            <a:schemeClr val="tx1"/>
+          </a:fontRef>
+        </p:style>
+      </p:cxnSp>
+      <p:cxnSp>
+        <p:nvCxnSpPr>
+          <p:cNvPr id="157" name="Conector angular 156"/>
+          <p:cNvCxnSpPr/>
+          <p:nvPr/>
+        </p:nvCxnSpPr>
+        <p:spPr>
+          <a:xfrm rot="16200000" flipH="1">
+            <a:off x="7729013" y="1087881"/>
+            <a:ext cx="187195" cy="18711"/>
+          </a:xfrm>
+          <a:prstGeom prst="bentConnector3">
+            <a:avLst>
+              <a:gd name="adj1" fmla="val -4340"/>
             </a:avLst>
           </a:prstGeom>
           <a:ln w="12700">

</xml_diff>